<commit_message>
Add distance tracking code Update diagram to new 32u4 module
</commit_message>
<xml_diff>
--- a/Diagrams/HatDiagram.pptx
+++ b/Diagrams/HatDiagram.pptx
@@ -112,6 +112,18 @@
 </p:presentation>
 </file>
 
+<file path=ppt/commentAuthors.xml><?xml version="1.0" encoding="utf-8"?>
+<p:cmAuthorLst xmlns:a="http://schemas.openxmlformats.org/drawingml/2006/main" xmlns:r="http://schemas.openxmlformats.org/officeDocument/2006/relationships" xmlns:p="http://schemas.openxmlformats.org/presentationml/2006/main">
+  <p:cmAuthor id="1" name="Austin Albert" initials="AA" lastIdx="1" clrIdx="0">
+    <p:extLst>
+      <p:ext uri="{19B8F6BF-5375-455C-9EA6-DF929625EA0E}">
+        <p15:presenceInfo xmlns:p15="http://schemas.microsoft.com/office/powerpoint/2012/main" userId="S::aalbert@tipconsulting.io::b5610f2a-2653-4ac6-878f-a27c60b73b7b" providerId="AD"/>
+      </p:ext>
+    </p:extLst>
+  </p:cmAuthor>
+</p:cmAuthorLst>
+</file>
+
 <file path=ppt/ink/ink1.xml><?xml version="1.0" encoding="utf-8"?>
 <inkml:ink xmlns:inkml="http://www.w3.org/2003/InkML">
   <inkml:definitions>
@@ -126,16 +138,16 @@
           <inkml:channelProperty channel="Y" name="resolution" value="1000" units="1/cm"/>
         </inkml:channelProperties>
       </inkml:inkSource>
-      <inkml:timestamp xml:id="ts0" timeString="2021-02-18T10:19:05.596"/>
+      <inkml:timestamp xml:id="ts0" timeString="2021-02-21T03:29:21.600"/>
     </inkml:context>
     <inkml:brush xml:id="br0">
-      <inkml:brushProperty name="width" value="0.2" units="cm"/>
-      <inkml:brushProperty name="height" value="0.2" units="cm"/>
-      <inkml:brushProperty name="color" value="#008C3A"/>
+      <inkml:brushProperty name="width" value="0.1" units="cm"/>
+      <inkml:brushProperty name="height" value="0.1" units="cm"/>
+      <inkml:brushProperty name="color" value="#E71224"/>
       <inkml:brushProperty name="ignorePressure" value="1"/>
     </inkml:brush>
   </inkml:definitions>
-  <inkml:trace contextRef="#ctx0" brushRef="#br0">14617 0,'-14595'0,"14574"0</inkml:trace>
+  <inkml:trace contextRef="#ctx0" brushRef="#br0">0 0,'17124'0,"-17141"0,24 0,25 0,-104 0,67 0</inkml:trace>
 </inkml:ink>
 </file>
 
@@ -153,16 +165,16 @@
           <inkml:channelProperty channel="Y" name="resolution" value="1000" units="1/cm"/>
         </inkml:channelProperties>
       </inkml:inkSource>
-      <inkml:timestamp xml:id="ts0" timeString="2021-02-18T10:21:11.767"/>
+      <inkml:timestamp xml:id="ts0" timeString="2021-02-21T03:39:26.207"/>
     </inkml:context>
     <inkml:brush xml:id="br0">
-      <inkml:brushProperty name="width" value="0.2" units="cm"/>
-      <inkml:brushProperty name="height" value="0.2" units="cm"/>
-      <inkml:brushProperty name="color" value="#5B2D90"/>
+      <inkml:brushProperty name="width" value="0.1" units="cm"/>
+      <inkml:brushProperty name="height" value="0.1" units="cm"/>
+      <inkml:brushProperty name="color" value="#00A0D7"/>
       <inkml:brushProperty name="ignorePressure" value="1"/>
     </inkml:brush>
   </inkml:definitions>
-  <inkml:trace contextRef="#ctx0" brushRef="#br0">0 1,'0'0</inkml:trace>
+  <inkml:trace contextRef="#ctx0" brushRef="#br0">5677 1,'-5663'1411,"5650"-1407</inkml:trace>
 </inkml:ink>
 </file>
 
@@ -180,16 +192,16 @@
           <inkml:channelProperty channel="Y" name="resolution" value="1000" units="1/cm"/>
         </inkml:channelProperties>
       </inkml:inkSource>
-      <inkml:timestamp xml:id="ts0" timeString="2021-02-18T10:21:16.232"/>
+      <inkml:timestamp xml:id="ts0" timeString="2021-02-21T03:40:09.996"/>
     </inkml:context>
     <inkml:brush xml:id="br0">
-      <inkml:brushProperty name="width" value="0.2" units="cm"/>
-      <inkml:brushProperty name="height" value="0.2" units="cm"/>
-      <inkml:brushProperty name="color" value="#5B2D90"/>
+      <inkml:brushProperty name="width" value="0.1" units="cm"/>
+      <inkml:brushProperty name="height" value="0.1" units="cm"/>
+      <inkml:brushProperty name="color" value="#008C3A"/>
       <inkml:brushProperty name="ignorePressure" value="1"/>
     </inkml:brush>
   </inkml:definitions>
-  <inkml:trace contextRef="#ctx0" brushRef="#br0">0 3046,'0'2654,"0"-8336,0 5665</inkml:trace>
+  <inkml:trace contextRef="#ctx0" brushRef="#br0">0 155,'0'6391,"0"-12924,0 6521</inkml:trace>
 </inkml:ink>
 </file>
 
@@ -207,16 +219,16 @@
           <inkml:channelProperty channel="Y" name="resolution" value="1000" units="1/cm"/>
         </inkml:channelProperties>
       </inkml:inkSource>
-      <inkml:timestamp xml:id="ts0" timeString="2021-02-18T10:21:29.876"/>
+      <inkml:timestamp xml:id="ts0" timeString="2021-02-21T03:40:51.354"/>
     </inkml:context>
     <inkml:brush xml:id="br0">
-      <inkml:brushProperty name="width" value="0.2" units="cm"/>
-      <inkml:brushProperty name="height" value="0.2" units="cm"/>
-      <inkml:brushProperty name="color" value="#5B2D90"/>
+      <inkml:brushProperty name="width" value="0.1" units="cm"/>
+      <inkml:brushProperty name="height" value="0.1" units="cm"/>
+      <inkml:brushProperty name="color" value="#FFC114"/>
       <inkml:brushProperty name="ignorePressure" value="1"/>
     </inkml:brush>
   </inkml:definitions>
-  <inkml:trace contextRef="#ctx0" brushRef="#br0">1 1,'0'5975,"0"-5951</inkml:trace>
+  <inkml:trace contextRef="#ctx0" brushRef="#br0">1 0,'921'4742,"-917"-4724</inkml:trace>
 </inkml:ink>
 </file>
 
@@ -234,16 +246,16 @@
           <inkml:channelProperty channel="Y" name="resolution" value="1000" units="1/cm"/>
         </inkml:channelProperties>
       </inkml:inkSource>
-      <inkml:timestamp xml:id="ts0" timeString="2021-02-18T10:21:42.967"/>
+      <inkml:timestamp xml:id="ts0" timeString="2021-02-21T03:41:12.198"/>
     </inkml:context>
     <inkml:brush xml:id="br0">
-      <inkml:brushProperty name="width" value="0.2" units="cm"/>
-      <inkml:brushProperty name="height" value="0.2" units="cm"/>
-      <inkml:brushProperty name="color" value="#33CCFF"/>
+      <inkml:brushProperty name="width" value="0.1" units="cm"/>
+      <inkml:brushProperty name="height" value="0.1" units="cm"/>
+      <inkml:brushProperty name="color" value="#FFC114"/>
       <inkml:brushProperty name="ignorePressure" value="1"/>
     </inkml:brush>
   </inkml:definitions>
-  <inkml:trace contextRef="#ctx0" brushRef="#br0">0 1,'15981'0,"-15951"0</inkml:trace>
+  <inkml:trace contextRef="#ctx0" brushRef="#br0">1 0,'14055'0,"-14037"0</inkml:trace>
 </inkml:ink>
 </file>
 
@@ -261,16 +273,16 @@
           <inkml:channelProperty channel="Y" name="resolution" value="1000" units="1/cm"/>
         </inkml:channelProperties>
       </inkml:inkSource>
-      <inkml:timestamp xml:id="ts0" timeString="2021-02-18T10:21:49.711"/>
+      <inkml:timestamp xml:id="ts0" timeString="2021-02-21T03:41:59.687"/>
     </inkml:context>
     <inkml:brush xml:id="br0">
-      <inkml:brushProperty name="width" value="0.2" units="cm"/>
-      <inkml:brushProperty name="height" value="0.2" units="cm"/>
-      <inkml:brushProperty name="color" value="#5B2D90"/>
+      <inkml:brushProperty name="width" value="0.1" units="cm"/>
+      <inkml:brushProperty name="height" value="0.1" units="cm"/>
+      <inkml:brushProperty name="color" value="#008C3A"/>
       <inkml:brushProperty name="ignorePressure" value="1"/>
     </inkml:brush>
   </inkml:definitions>
-  <inkml:trace contextRef="#ctx0" brushRef="#br0">0 1,'16737'0,"-16713"0</inkml:trace>
+  <inkml:trace contextRef="#ctx0" brushRef="#br0">1 1,'1019'5246,"-1016"-5230</inkml:trace>
 </inkml:ink>
 </file>
 
@@ -288,16 +300,16 @@
           <inkml:channelProperty channel="Y" name="resolution" value="1000" units="1/cm"/>
         </inkml:channelProperties>
       </inkml:inkSource>
-      <inkml:timestamp xml:id="ts0" timeString="2021-02-18T10:22:04.311"/>
+      <inkml:timestamp xml:id="ts0" timeString="2021-02-21T03:42:09.985"/>
     </inkml:context>
     <inkml:brush xml:id="br0">
-      <inkml:brushProperty name="width" value="0.2" units="cm"/>
-      <inkml:brushProperty name="height" value="0.2" units="cm"/>
-      <inkml:brushProperty name="color" value="#5B2D90"/>
+      <inkml:brushProperty name="width" value="0.1" units="cm"/>
+      <inkml:brushProperty name="height" value="0.1" units="cm"/>
+      <inkml:brushProperty name="color" value="#008C3A"/>
       <inkml:brushProperty name="ignorePressure" value="1"/>
     </inkml:brush>
   </inkml:definitions>
-  <inkml:trace contextRef="#ctx0" brushRef="#br0">1 37,'496'0,"-469"-2,0 0,46-12,-45 8,1 1,33-2,282 7,-158 1,-159 1,0 0,46 12,-45-8,2-1,31 2,-31-7,-13 0,1 0,-1 0,0 2,0 0,0 1,-1 1,1 1,31 12,-36-11,1 0,0-1,0 0,0-1,0-1,15 3,0-3</inkml:trace>
+  <inkml:trace contextRef="#ctx0" brushRef="#br0">0 0,'17865'0,"-17847"0</inkml:trace>
 </inkml:ink>
 </file>
 
@@ -315,16 +327,16 @@
           <inkml:channelProperty channel="Y" name="resolution" value="1000" units="1/cm"/>
         </inkml:channelProperties>
       </inkml:inkSource>
-      <inkml:timestamp xml:id="ts0" timeString="2021-02-18T10:22:07.539"/>
+      <inkml:timestamp xml:id="ts0" timeString="2021-02-21T03:42:29.351"/>
     </inkml:context>
     <inkml:brush xml:id="br0">
-      <inkml:brushProperty name="width" value="0.2" units="cm"/>
-      <inkml:brushProperty name="height" value="0.2" units="cm"/>
-      <inkml:brushProperty name="color" value="#33CCFF"/>
+      <inkml:brushProperty name="width" value="0.1" units="cm"/>
+      <inkml:brushProperty name="height" value="0.1" units="cm"/>
+      <inkml:brushProperty name="color" value="#008C3A"/>
       <inkml:brushProperty name="ignorePressure" value="1"/>
     </inkml:brush>
   </inkml:definitions>
-  <inkml:trace contextRef="#ctx0" brushRef="#br0">0 206,'0'-2,"1"1,-1 0,1 0,-1 0,1-1,-1 1,1 0,-1 0,1 0,0 0,0 0,0 0,-1 0,1 0,0 1,0-1,0 0,0 0,0 1,1-1,-1 1,0-1,0 1,0-1,0 1,1 0,0-1,39-6,-37 6,37-2,42 3,-56 1,1-1,-1-1,1-1,44-10,-39 4,1 3,-1 1,1 1,46 2,36-2,30-26,-52 10,-68 12,0 2,36-4,-26 6,44-11,-48 7,66-4,-75 9,-1-1,0-1,26-8,-44 11,20-5</inkml:trace>
+  <inkml:trace contextRef="#ctx0" brushRef="#br0">0 7358,'772'-7345,"-771"7333</inkml:trace>
 </inkml:ink>
 </file>
 
@@ -342,16 +354,16 @@
           <inkml:channelProperty channel="Y" name="resolution" value="1000" units="1/cm"/>
         </inkml:channelProperties>
       </inkml:inkSource>
-      <inkml:timestamp xml:id="ts0" timeString="2021-02-18T10:22:31.540"/>
+      <inkml:timestamp xml:id="ts0" timeString="2021-02-21T03:42:37.426"/>
     </inkml:context>
     <inkml:brush xml:id="br0">
-      <inkml:brushProperty name="width" value="0.2" units="cm"/>
-      <inkml:brushProperty name="height" value="0.2" units="cm"/>
-      <inkml:brushProperty name="color" value="#E71224"/>
+      <inkml:brushProperty name="width" value="0.1" units="cm"/>
+      <inkml:brushProperty name="height" value="0.1" units="cm"/>
+      <inkml:brushProperty name="color" value="#FFC114"/>
       <inkml:brushProperty name="ignorePressure" value="1"/>
     </inkml:brush>
   </inkml:definitions>
-  <inkml:trace contextRef="#ctx0" brushRef="#br0">1 1,'11885'0,"-11875"0</inkml:trace>
+  <inkml:trace contextRef="#ctx0" brushRef="#br0">0 7346,'770'-7328,"-768"7310</inkml:trace>
 </inkml:ink>
 </file>
 
@@ -369,16 +381,16 @@
           <inkml:channelProperty channel="Y" name="resolution" value="1000" units="1/cm"/>
         </inkml:channelProperties>
       </inkml:inkSource>
-      <inkml:timestamp xml:id="ts0" timeString="2021-02-18T10:22:46.773"/>
+      <inkml:timestamp xml:id="ts0" timeString="2021-02-21T03:35:11.685"/>
     </inkml:context>
     <inkml:brush xml:id="br0">
-      <inkml:brushProperty name="width" value="0.2" units="cm"/>
-      <inkml:brushProperty name="height" value="0.2" units="cm"/>
-      <inkml:brushProperty name="color" value="#E71224"/>
+      <inkml:brushProperty name="width" value="0.1" units="cm"/>
+      <inkml:brushProperty name="height" value="0.1" units="cm"/>
+      <inkml:brushProperty name="color" value="#00A0D7"/>
       <inkml:brushProperty name="ignorePressure" value="1"/>
     </inkml:brush>
   </inkml:definitions>
-  <inkml:trace contextRef="#ctx0" brushRef="#br0">1 35,'4'-1,"1"1,-1-2,0 1,1-1,-1 1,0-1,5-3,26-9,-21 12,1 0,0 1,0 0,0 1,-1 1,1 0,0 1,0 1,24 7,-33-8,1 0,-1 1,0 0,0 0,0 0,-1 1,1 0,-1 0,0 0,0 1,0 0,-1 0,1 0,-1 0,0 1,-1-1,1 1,-1 0,0 0,-1 1,0-1,0 0,2 12,1 30,-2 1,-8 90,1-20,4-86,2 0,1 0,13 58,-14-84,-1 0,1 0,-1 0,0 0,-1 1,0-1,0 0,0 0,-3 9,2-13,0-1,0 1,0 0,0-1,-1 1,1-1,-1 0,0 1,0-1,0 0,0 0,0 0,0 0,-1-1,1 1,-1-1,1 1,-1-1,1 0,-1 0,0 0,0 0,1 0,-1-1,-5 1,-14 2,0-1,-36-2,26-2</inkml:trace>
+  <inkml:trace contextRef="#ctx0" brushRef="#br0">1 1145,'10868'-1143,"-10853"1142</inkml:trace>
 </inkml:ink>
 </file>
 
@@ -396,16 +408,16 @@
           <inkml:channelProperty channel="Y" name="resolution" value="1000" units="1/cm"/>
         </inkml:channelProperties>
       </inkml:inkSource>
-      <inkml:timestamp xml:id="ts0" timeString="2021-02-18T10:23:46.412"/>
+      <inkml:timestamp xml:id="ts0" timeString="2021-02-21T03:34:52.642"/>
     </inkml:context>
     <inkml:brush xml:id="br0">
-      <inkml:brushProperty name="width" value="0.2" units="cm"/>
-      <inkml:brushProperty name="height" value="0.2" units="cm"/>
-      <inkml:brushProperty name="color" value="#008C3A"/>
+      <inkml:brushProperty name="width" value="0.1" units="cm"/>
+      <inkml:brushProperty name="height" value="0.1" units="cm"/>
+      <inkml:brushProperty name="color" value="#FFC114"/>
       <inkml:brushProperty name="ignorePressure" value="1"/>
     </inkml:brush>
   </inkml:definitions>
-  <inkml:trace contextRef="#ctx0" brushRef="#br0">0 0,'0'6001,"0"-5974</inkml:trace>
+  <inkml:trace contextRef="#ctx0" brushRef="#br0">11175 0,'-11160'1173,"11146"-1171</inkml:trace>
 </inkml:ink>
 </file>
 
@@ -423,286 +435,16 @@
           <inkml:channelProperty channel="Y" name="resolution" value="1000" units="1/cm"/>
         </inkml:channelProperties>
       </inkml:inkSource>
-      <inkml:timestamp xml:id="ts0" timeString="2021-02-18T10:19:22.912"/>
+      <inkml:timestamp xml:id="ts0" timeString="2021-02-21T03:29:43.209"/>
     </inkml:context>
     <inkml:brush xml:id="br0">
-      <inkml:brushProperty name="width" value="0.2" units="cm"/>
-      <inkml:brushProperty name="height" value="0.2" units="cm"/>
-      <inkml:brushProperty name="color" value="#008C3A"/>
+      <inkml:brushProperty name="width" value="0.1" units="cm"/>
+      <inkml:brushProperty name="height" value="0.1" units="cm"/>
+      <inkml:brushProperty name="color" value="#E71224"/>
       <inkml:brushProperty name="ignorePressure" value="1"/>
     </inkml:brush>
   </inkml:definitions>
-  <inkml:trace contextRef="#ctx0" brushRef="#br0">0 0,'0'4874,"0"-4863</inkml:trace>
-</inkml:ink>
-</file>
-
-<file path=ppt/ink/ink20.xml><?xml version="1.0" encoding="utf-8"?>
-<inkml:ink xmlns:inkml="http://www.w3.org/2003/InkML">
-  <inkml:definitions>
-    <inkml:context xml:id="ctx0">
-      <inkml:inkSource xml:id="inkSrc0">
-        <inkml:traceFormat>
-          <inkml:channel name="X" type="integer" min="-2.14748E9" max="2.14748E9" units="cm"/>
-          <inkml:channel name="Y" type="integer" min="-2.14748E9" max="2.14748E9" units="cm"/>
-        </inkml:traceFormat>
-        <inkml:channelProperties>
-          <inkml:channelProperty channel="X" name="resolution" value="1000" units="1/cm"/>
-          <inkml:channelProperty channel="Y" name="resolution" value="1000" units="1/cm"/>
-        </inkml:channelProperties>
-      </inkml:inkSource>
-      <inkml:timestamp xml:id="ts0" timeString="2021-02-18T10:24:00.968"/>
-    </inkml:context>
-    <inkml:brush xml:id="br0">
-      <inkml:brushProperty name="width" value="0.2" units="cm"/>
-      <inkml:brushProperty name="height" value="0.2" units="cm"/>
-      <inkml:brushProperty name="color" value="#008C3A"/>
-      <inkml:brushProperty name="ignorePressure" value="1"/>
-    </inkml:brush>
-  </inkml:definitions>
-  <inkml:trace contextRef="#ctx0" brushRef="#br0">0 0,'1'12,"1"-1,0 1,0-1,1 0,1 0,0 0,7 14,3 3,26 39,-34-60,-1-1,1-1,0 1,0-1,0 0,1 0,0-1,0 0,0 0,0-1,1 0,0 0,13 3,3 0,0-2,0 0,32 0,-21-3,0-2,0-1,0-2,52-12,-55 8,17-3,88-33,-116 35</inkml:trace>
-</inkml:ink>
-</file>
-
-<file path=ppt/ink/ink21.xml><?xml version="1.0" encoding="utf-8"?>
-<inkml:ink xmlns:inkml="http://www.w3.org/2003/InkML">
-  <inkml:definitions>
-    <inkml:context xml:id="ctx0">
-      <inkml:inkSource xml:id="inkSrc0">
-        <inkml:traceFormat>
-          <inkml:channel name="X" type="integer" min="-2.14748E9" max="2.14748E9" units="cm"/>
-          <inkml:channel name="Y" type="integer" min="-2.14748E9" max="2.14748E9" units="cm"/>
-        </inkml:traceFormat>
-        <inkml:channelProperties>
-          <inkml:channelProperty channel="X" name="resolution" value="1000" units="1/cm"/>
-          <inkml:channelProperty channel="Y" name="resolution" value="1000" units="1/cm"/>
-        </inkml:channelProperties>
-      </inkml:inkSource>
-      <inkml:timestamp xml:id="ts0" timeString="2021-02-18T10:24:34.984"/>
-    </inkml:context>
-    <inkml:brush xml:id="br0">
-      <inkml:brushProperty name="width" value="0.2" units="cm"/>
-      <inkml:brushProperty name="height" value="0.2" units="cm"/>
-      <inkml:brushProperty name="color" value="#33CCFF"/>
-      <inkml:brushProperty name="ignorePressure" value="1"/>
-    </inkml:brush>
-  </inkml:definitions>
-  <inkml:trace contextRef="#ctx0" brushRef="#br0">0 2789,'0'-2767,"0"2745</inkml:trace>
-</inkml:ink>
-</file>
-
-<file path=ppt/ink/ink22.xml><?xml version="1.0" encoding="utf-8"?>
-<inkml:ink xmlns:inkml="http://www.w3.org/2003/InkML">
-  <inkml:definitions>
-    <inkml:context xml:id="ctx0">
-      <inkml:inkSource xml:id="inkSrc0">
-        <inkml:traceFormat>
-          <inkml:channel name="X" type="integer" min="-2.14748E9" max="2.14748E9" units="cm"/>
-          <inkml:channel name="Y" type="integer" min="-2.14748E9" max="2.14748E9" units="cm"/>
-        </inkml:traceFormat>
-        <inkml:channelProperties>
-          <inkml:channelProperty channel="X" name="resolution" value="1000" units="1/cm"/>
-          <inkml:channelProperty channel="Y" name="resolution" value="1000" units="1/cm"/>
-        </inkml:channelProperties>
-      </inkml:inkSource>
-      <inkml:timestamp xml:id="ts0" timeString="2021-02-18T10:24:50.427"/>
-    </inkml:context>
-    <inkml:brush xml:id="br0">
-      <inkml:brushProperty name="width" value="0.2" units="cm"/>
-      <inkml:brushProperty name="height" value="0.2" units="cm"/>
-      <inkml:brushProperty name="color" value="#33CCFF"/>
-      <inkml:brushProperty name="ignorePressure" value="1"/>
-    </inkml:brush>
-  </inkml:definitions>
-  <inkml:trace contextRef="#ctx0" brushRef="#br0">1 0,'5800'0,"-5776"0</inkml:trace>
-</inkml:ink>
-</file>
-
-<file path=ppt/ink/ink23.xml><?xml version="1.0" encoding="utf-8"?>
-<inkml:ink xmlns:inkml="http://www.w3.org/2003/InkML">
-  <inkml:definitions>
-    <inkml:context xml:id="ctx0">
-      <inkml:inkSource xml:id="inkSrc0">
-        <inkml:traceFormat>
-          <inkml:channel name="X" type="integer" min="-2.14748E9" max="2.14748E9" units="cm"/>
-          <inkml:channel name="Y" type="integer" min="-2.14748E9" max="2.14748E9" units="cm"/>
-        </inkml:traceFormat>
-        <inkml:channelProperties>
-          <inkml:channelProperty channel="X" name="resolution" value="1000" units="1/cm"/>
-          <inkml:channelProperty channel="Y" name="resolution" value="1000" units="1/cm"/>
-        </inkml:channelProperties>
-      </inkml:inkSource>
-      <inkml:timestamp xml:id="ts0" timeString="2021-02-18T10:25:14.281"/>
-    </inkml:context>
-    <inkml:brush xml:id="br0">
-      <inkml:brushProperty name="width" value="0.2" units="cm"/>
-      <inkml:brushProperty name="height" value="0.2" units="cm"/>
-      <inkml:brushProperty name="color" value="#F6630D"/>
-      <inkml:brushProperty name="ignorePressure" value="1"/>
-    </inkml:brush>
-  </inkml:definitions>
-  <inkml:trace contextRef="#ctx0" brushRef="#br0">0 1,'5936'0,"-5912"0</inkml:trace>
-</inkml:ink>
-</file>
-
-<file path=ppt/ink/ink24.xml><?xml version="1.0" encoding="utf-8"?>
-<inkml:ink xmlns:inkml="http://www.w3.org/2003/InkML">
-  <inkml:definitions>
-    <inkml:context xml:id="ctx0">
-      <inkml:inkSource xml:id="inkSrc0">
-        <inkml:traceFormat>
-          <inkml:channel name="X" type="integer" min="-2.14748E9" max="2.14748E9" units="cm"/>
-          <inkml:channel name="Y" type="integer" min="-2.14748E9" max="2.14748E9" units="cm"/>
-        </inkml:traceFormat>
-        <inkml:channelProperties>
-          <inkml:channelProperty channel="X" name="resolution" value="1000" units="1/cm"/>
-          <inkml:channelProperty channel="Y" name="resolution" value="1000" units="1/cm"/>
-        </inkml:channelProperties>
-      </inkml:inkSource>
-      <inkml:timestamp xml:id="ts0" timeString="2021-02-18T10:25:26.569"/>
-    </inkml:context>
-    <inkml:brush xml:id="br0">
-      <inkml:brushProperty name="width" value="0.2" units="cm"/>
-      <inkml:brushProperty name="height" value="0.2" units="cm"/>
-      <inkml:brushProperty name="color" value="#F6630D"/>
-      <inkml:brushProperty name="ignorePressure" value="1"/>
-    </inkml:brush>
-  </inkml:definitions>
-  <inkml:trace contextRef="#ctx0" brushRef="#br0">1 0,'10232'0,"-10202"0</inkml:trace>
-</inkml:ink>
-</file>
-
-<file path=ppt/ink/ink25.xml><?xml version="1.0" encoding="utf-8"?>
-<inkml:ink xmlns:inkml="http://www.w3.org/2003/InkML">
-  <inkml:definitions>
-    <inkml:context xml:id="ctx0">
-      <inkml:inkSource xml:id="inkSrc0">
-        <inkml:traceFormat>
-          <inkml:channel name="X" type="integer" min="-2.14748E9" max="2.14748E9" units="cm"/>
-          <inkml:channel name="Y" type="integer" min="-2.14748E9" max="2.14748E9" units="cm"/>
-        </inkml:traceFormat>
-        <inkml:channelProperties>
-          <inkml:channelProperty channel="X" name="resolution" value="1000" units="1/cm"/>
-          <inkml:channelProperty channel="Y" name="resolution" value="1000" units="1/cm"/>
-        </inkml:channelProperties>
-      </inkml:inkSource>
-      <inkml:timestamp xml:id="ts0" timeString="2021-02-18T10:25:40.211"/>
-    </inkml:context>
-    <inkml:brush xml:id="br0">
-      <inkml:brushProperty name="width" value="0.2" units="cm"/>
-      <inkml:brushProperty name="height" value="0.2" units="cm"/>
-      <inkml:brushProperty name="color" value="#F6630D"/>
-      <inkml:brushProperty name="ignorePressure" value="1"/>
-    </inkml:brush>
-  </inkml:definitions>
-  <inkml:trace contextRef="#ctx0" brushRef="#br0">0 1,'0'1652,"0"-1629</inkml:trace>
-</inkml:ink>
-</file>
-
-<file path=ppt/ink/ink26.xml><?xml version="1.0" encoding="utf-8"?>
-<inkml:ink xmlns:inkml="http://www.w3.org/2003/InkML">
-  <inkml:definitions>
-    <inkml:context xml:id="ctx0">
-      <inkml:inkSource xml:id="inkSrc0">
-        <inkml:traceFormat>
-          <inkml:channel name="X" type="integer" min="-2.14748E9" max="2.14748E9" units="cm"/>
-          <inkml:channel name="Y" type="integer" min="-2.14748E9" max="2.14748E9" units="cm"/>
-        </inkml:traceFormat>
-        <inkml:channelProperties>
-          <inkml:channelProperty channel="X" name="resolution" value="1000" units="1/cm"/>
-          <inkml:channelProperty channel="Y" name="resolution" value="1000" units="1/cm"/>
-        </inkml:channelProperties>
-      </inkml:inkSource>
-      <inkml:timestamp xml:id="ts0" timeString="2021-02-18T10:25:46.608"/>
-    </inkml:context>
-    <inkml:brush xml:id="br0">
-      <inkml:brushProperty name="width" value="0.2" units="cm"/>
-      <inkml:brushProperty name="height" value="0.2" units="cm"/>
-      <inkml:brushProperty name="color" value="#F6630D"/>
-      <inkml:brushProperty name="ignorePressure" value="1"/>
-    </inkml:brush>
-  </inkml:definitions>
-  <inkml:trace contextRef="#ctx0" brushRef="#br0">1 1,'0'5398,"0"-5409</inkml:trace>
-</inkml:ink>
-</file>
-
-<file path=ppt/ink/ink27.xml><?xml version="1.0" encoding="utf-8"?>
-<inkml:ink xmlns:inkml="http://www.w3.org/2003/InkML">
-  <inkml:definitions>
-    <inkml:context xml:id="ctx0">
-      <inkml:inkSource xml:id="inkSrc0">
-        <inkml:traceFormat>
-          <inkml:channel name="X" type="integer" min="-2.14748E9" max="2.14748E9" units="cm"/>
-          <inkml:channel name="Y" type="integer" min="-2.14748E9" max="2.14748E9" units="cm"/>
-        </inkml:traceFormat>
-        <inkml:channelProperties>
-          <inkml:channelProperty channel="X" name="resolution" value="1000" units="1/cm"/>
-          <inkml:channelProperty channel="Y" name="resolution" value="1000" units="1/cm"/>
-        </inkml:channelProperties>
-      </inkml:inkSource>
-      <inkml:timestamp xml:id="ts0" timeString="2021-02-18T10:26:02.889"/>
-    </inkml:context>
-    <inkml:brush xml:id="br0">
-      <inkml:brushProperty name="width" value="0.2" units="cm"/>
-      <inkml:brushProperty name="height" value="0.2" units="cm"/>
-      <inkml:brushProperty name="color" value="#008C3A"/>
-      <inkml:brushProperty name="ignorePressure" value="1"/>
-    </inkml:brush>
-  </inkml:definitions>
-  <inkml:trace contextRef="#ctx0" brushRef="#br0">1 1,'0'3281,"0"-3250</inkml:trace>
-</inkml:ink>
-</file>
-
-<file path=ppt/ink/ink28.xml><?xml version="1.0" encoding="utf-8"?>
-<inkml:ink xmlns:inkml="http://www.w3.org/2003/InkML">
-  <inkml:definitions>
-    <inkml:context xml:id="ctx0">
-      <inkml:inkSource xml:id="inkSrc0">
-        <inkml:traceFormat>
-          <inkml:channel name="X" type="integer" min="-2.14748E9" max="2.14748E9" units="cm"/>
-          <inkml:channel name="Y" type="integer" min="-2.14748E9" max="2.14748E9" units="cm"/>
-        </inkml:traceFormat>
-        <inkml:channelProperties>
-          <inkml:channelProperty channel="X" name="resolution" value="1000" units="1/cm"/>
-          <inkml:channelProperty channel="Y" name="resolution" value="1000" units="1/cm"/>
-        </inkml:channelProperties>
-      </inkml:inkSource>
-      <inkml:timestamp xml:id="ts0" timeString="2021-02-18T10:26:21.275"/>
-    </inkml:context>
-    <inkml:brush xml:id="br0">
-      <inkml:brushProperty name="width" value="0.2" units="cm"/>
-      <inkml:brushProperty name="height" value="0.2" units="cm"/>
-      <inkml:brushProperty name="color" value="#008C3A"/>
-      <inkml:brushProperty name="ignorePressure" value="1"/>
-    </inkml:brush>
-  </inkml:definitions>
-  <inkml:trace contextRef="#ctx0" brushRef="#br0">8815 0,'-8784'0,"8754"0</inkml:trace>
-</inkml:ink>
-</file>
-
-<file path=ppt/ink/ink29.xml><?xml version="1.0" encoding="utf-8"?>
-<inkml:ink xmlns:inkml="http://www.w3.org/2003/InkML">
-  <inkml:definitions>
-    <inkml:context xml:id="ctx0">
-      <inkml:inkSource xml:id="inkSrc0">
-        <inkml:traceFormat>
-          <inkml:channel name="X" type="integer" min="-2.14748E9" max="2.14748E9" units="cm"/>
-          <inkml:channel name="Y" type="integer" min="-2.14748E9" max="2.14748E9" units="cm"/>
-        </inkml:traceFormat>
-        <inkml:channelProperties>
-          <inkml:channelProperty channel="X" name="resolution" value="1000" units="1/cm"/>
-          <inkml:channelProperty channel="Y" name="resolution" value="1000" units="1/cm"/>
-        </inkml:channelProperties>
-      </inkml:inkSource>
-      <inkml:timestamp xml:id="ts0" timeString="2021-02-18T10:26:32.588"/>
-    </inkml:context>
-    <inkml:brush xml:id="br0">
-      <inkml:brushProperty name="width" value="0.2" units="cm"/>
-      <inkml:brushProperty name="height" value="0.2" units="cm"/>
-      <inkml:brushProperty name="color" value="#008C3A"/>
-      <inkml:brushProperty name="ignorePressure" value="1"/>
-    </inkml:brush>
-  </inkml:definitions>
-  <inkml:trace contextRef="#ctx0" brushRef="#br0">1 1,'11021'0,"-10996"0</inkml:trace>
+  <inkml:trace contextRef="#ctx0" brushRef="#br0">859 477,'-846'-469,"833"462</inkml:trace>
 </inkml:ink>
 </file>
 
@@ -720,70 +462,16 @@
           <inkml:channelProperty channel="Y" name="resolution" value="1000" units="1/cm"/>
         </inkml:channelProperties>
       </inkml:inkSource>
-      <inkml:timestamp xml:id="ts0" timeString="2021-02-18T10:19:29.957"/>
+      <inkml:timestamp xml:id="ts0" timeString="2021-02-21T03:29:56.600"/>
     </inkml:context>
     <inkml:brush xml:id="br0">
-      <inkml:brushProperty name="width" value="0.2" units="cm"/>
-      <inkml:brushProperty name="height" value="0.2" units="cm"/>
-      <inkml:brushProperty name="color" value="#008C3A"/>
+      <inkml:brushProperty name="width" value="0.1" units="cm"/>
+      <inkml:brushProperty name="height" value="0.1" units="cm"/>
+      <inkml:brushProperty name="color" value="#E71224"/>
       <inkml:brushProperty name="ignorePressure" value="1"/>
     </inkml:brush>
   </inkml:definitions>
-  <inkml:trace contextRef="#ctx0" brushRef="#br0">1 1,'0'2916,"0"-2929</inkml:trace>
-</inkml:ink>
-</file>
-
-<file path=ppt/ink/ink30.xml><?xml version="1.0" encoding="utf-8"?>
-<inkml:ink xmlns:inkml="http://www.w3.org/2003/InkML">
-  <inkml:definitions>
-    <inkml:context xml:id="ctx0">
-      <inkml:inkSource xml:id="inkSrc0">
-        <inkml:traceFormat>
-          <inkml:channel name="X" type="integer" min="-2.14748E9" max="2.14748E9" units="cm"/>
-          <inkml:channel name="Y" type="integer" min="-2.14748E9" max="2.14748E9" units="cm"/>
-        </inkml:traceFormat>
-        <inkml:channelProperties>
-          <inkml:channelProperty channel="X" name="resolution" value="1000" units="1/cm"/>
-          <inkml:channelProperty channel="Y" name="resolution" value="1000" units="1/cm"/>
-        </inkml:channelProperties>
-      </inkml:inkSource>
-      <inkml:timestamp xml:id="ts0" timeString="2021-02-18T10:26:44.383"/>
-    </inkml:context>
-    <inkml:brush xml:id="br0">
-      <inkml:brushProperty name="width" value="0.2" units="cm"/>
-      <inkml:brushProperty name="height" value="0.2" units="cm"/>
-      <inkml:brushProperty name="color" value="#008C3A"/>
-      <inkml:brushProperty name="ignorePressure" value="1"/>
-    </inkml:brush>
-  </inkml:definitions>
-  <inkml:trace contextRef="#ctx0" brushRef="#br0">0 2429,'0'-2399,"0"2369</inkml:trace>
-</inkml:ink>
-</file>
-
-<file path=ppt/ink/ink31.xml><?xml version="1.0" encoding="utf-8"?>
-<inkml:ink xmlns:inkml="http://www.w3.org/2003/InkML">
-  <inkml:definitions>
-    <inkml:context xml:id="ctx0">
-      <inkml:inkSource xml:id="inkSrc0">
-        <inkml:traceFormat>
-          <inkml:channel name="X" type="integer" min="-2.14748E9" max="2.14748E9" units="cm"/>
-          <inkml:channel name="Y" type="integer" min="-2.14748E9" max="2.14748E9" units="cm"/>
-        </inkml:traceFormat>
-        <inkml:channelProperties>
-          <inkml:channelProperty channel="X" name="resolution" value="1000" units="1/cm"/>
-          <inkml:channelProperty channel="Y" name="resolution" value="1000" units="1/cm"/>
-        </inkml:channelProperties>
-      </inkml:inkSource>
-      <inkml:timestamp xml:id="ts0" timeString="2021-02-18T10:26:52.460"/>
-    </inkml:context>
-    <inkml:brush xml:id="br0">
-      <inkml:brushProperty name="width" value="0.2" units="cm"/>
-      <inkml:brushProperty name="height" value="0.2" units="cm"/>
-      <inkml:brushProperty name="color" value="#008C3A"/>
-      <inkml:brushProperty name="ignorePressure" value="1"/>
-    </inkml:brush>
-  </inkml:definitions>
-  <inkml:trace contextRef="#ctx0" brushRef="#br0">1 5876,'0'2391,"0"-10640,0 8231</inkml:trace>
+  <inkml:trace contextRef="#ctx0" brushRef="#br0">1 0,'0'5656,"0"-5646</inkml:trace>
 </inkml:ink>
 </file>
 
@@ -801,16 +489,16 @@
           <inkml:channelProperty channel="Y" name="resolution" value="1000" units="1/cm"/>
         </inkml:channelProperties>
       </inkml:inkSource>
-      <inkml:timestamp xml:id="ts0" timeString="2021-02-18T10:19:41.008"/>
+      <inkml:timestamp xml:id="ts0" timeString="2021-02-21T03:29:59.815"/>
     </inkml:context>
     <inkml:brush xml:id="br0">
-      <inkml:brushProperty name="width" value="0.2" units="cm"/>
-      <inkml:brushProperty name="height" value="0.2" units="cm"/>
-      <inkml:brushProperty name="color" value="#008C3A"/>
+      <inkml:brushProperty name="width" value="0.1" units="cm"/>
+      <inkml:brushProperty name="height" value="0.1" units="cm"/>
+      <inkml:brushProperty name="color" value="#E71224"/>
       <inkml:brushProperty name="ignorePressure" value="1"/>
     </inkml:brush>
   </inkml:definitions>
-  <inkml:trace contextRef="#ctx0" brushRef="#br0">0 1,'10'1,"0"0,0 1,0 0,0 1,-1 0,1 1,16 8,-15-6,0-1,1 0,0-1,-1-1,16 3,63 0,121-7,-69-2,-96-5,3-1,-47 8,0 1,1 0,-1 0,0 0,1 0,-1 0,0 1,1-1,-1 1,0-1,0 1,0 0,1 0,-1 0,2 2,6 7</inkml:trace>
+  <inkml:trace contextRef="#ctx0" brushRef="#br0">324 0,'-7'2,"1"0,-1 0,1 0,-1 1,-7 4,2-2,12-5,-21 8,1 1,1 1,-27 18,40-24,0 1,1 1,-1-1,1 1,0 0,0 0,0 0,1 1,0 0,1 0,-1 0,1 0,-2 9,-31 78,23-63,1 1,-14 58,24-80,1 0,0 0,0 0,1 0,0-1,1 1,0 0,1 0,0 0,0-1,1 1,0-1,9 18,7 10,-2 1,-2 1,12 44,23 163,-47-227,0 0,1-1,1 1,0-1,2 0,0-1,1 1,1-1,0-1,1 0,1 0,1-1,17 18,-19-25</inkml:trace>
 </inkml:ink>
 </file>
 
@@ -828,16 +516,16 @@
           <inkml:channelProperty channel="Y" name="resolution" value="1000" units="1/cm"/>
         </inkml:channelProperties>
       </inkml:inkSource>
-      <inkml:timestamp xml:id="ts0" timeString="2021-02-18T10:19:53.379"/>
+      <inkml:timestamp xml:id="ts0" timeString="2021-02-21T03:30:31.219"/>
     </inkml:context>
     <inkml:brush xml:id="br0">
-      <inkml:brushProperty name="width" value="0.2" units="cm"/>
-      <inkml:brushProperty name="height" value="0.2" units="cm"/>
+      <inkml:brushProperty name="width" value="0.1" units="cm"/>
+      <inkml:brushProperty name="height" value="0.1" units="cm"/>
       <inkml:brushProperty name="color" value="#008C3A"/>
       <inkml:brushProperty name="ignorePressure" value="1"/>
     </inkml:brush>
   </inkml:definitions>
-  <inkml:trace contextRef="#ctx0" brushRef="#br0">1 1,'1'12,"1"0,0-1,1 1,0-1,0 1,10 18,-6-15,-1 1,7 29,-7 11,-2 2,-5 101,-2-45,2-96,-1 0,-1 0,-6 23,-6 42,6-38,7-38,0 0,0-1,1 1,0 0,0 0,1 1,0-1,0 9,1-14,0 0,0 0,0 0,1 0,-1-1,0 1,1 0,-1-1,1 1,0-1,-1 1,1-1,0 0,0 1,0-1,0 0,0 0,0-1,0 1,0 0,0-1,0 1,1-1,-1 0,3 1,64 0,-54-2,463-3,-455 6,-1 0,39 9,-36-6,-1 0,28 0,213-6,-239 1</inkml:trace>
+  <inkml:trace contextRef="#ctx0" brushRef="#br0">0 1,'10456'0,"-10437"0</inkml:trace>
 </inkml:ink>
 </file>
 
@@ -855,16 +543,16 @@
           <inkml:channelProperty channel="Y" name="resolution" value="1000" units="1/cm"/>
         </inkml:channelProperties>
       </inkml:inkSource>
-      <inkml:timestamp xml:id="ts0" timeString="2021-02-18T10:20:39.467"/>
+      <inkml:timestamp xml:id="ts0" timeString="2021-02-21T03:32:29.575"/>
     </inkml:context>
     <inkml:brush xml:id="br0">
-      <inkml:brushProperty name="width" value="0.2" units="cm"/>
-      <inkml:brushProperty name="height" value="0.2" units="cm"/>
-      <inkml:brushProperty name="color" value="#33CCFF"/>
+      <inkml:brushProperty name="width" value="0.1" units="cm"/>
+      <inkml:brushProperty name="height" value="0.1" units="cm"/>
+      <inkml:brushProperty name="color" value="#008C3A"/>
       <inkml:brushProperty name="ignorePressure" value="1"/>
     </inkml:brush>
   </inkml:definitions>
-  <inkml:trace contextRef="#ctx0" brushRef="#br0">0 1,'0'4344,"0"-4329</inkml:trace>
+  <inkml:trace contextRef="#ctx0" brushRef="#br0">0 0,'0'3890,"0"-3879</inkml:trace>
 </inkml:ink>
 </file>
 
@@ -882,16 +570,16 @@
           <inkml:channelProperty channel="Y" name="resolution" value="1000" units="1/cm"/>
         </inkml:channelProperties>
       </inkml:inkSource>
-      <inkml:timestamp xml:id="ts0" timeString="2021-02-18T10:20:45.347"/>
+      <inkml:timestamp xml:id="ts0" timeString="2021-02-21T03:34:17.052"/>
     </inkml:context>
     <inkml:brush xml:id="br0">
-      <inkml:brushProperty name="width" value="0.2" units="cm"/>
-      <inkml:brushProperty name="height" value="0.2" units="cm"/>
-      <inkml:brushProperty name="color" value="#33CCFF"/>
+      <inkml:brushProperty name="width" value="0.1" units="cm"/>
+      <inkml:brushProperty name="height" value="0.1" units="cm"/>
+      <inkml:brushProperty name="color" value="#FFC114"/>
       <inkml:brushProperty name="ignorePressure" value="1"/>
     </inkml:brush>
   </inkml:definitions>
-  <inkml:trace contextRef="#ctx0" brushRef="#br0">0 267,'0'112,"0"-66,0-38,0-14,0-421,0 5454,0-5043,0-2</inkml:trace>
+  <inkml:trace contextRef="#ctx0" brushRef="#br0">0 2561,'0'-2544,"0"2528</inkml:trace>
 </inkml:ink>
 </file>
 
@@ -909,16 +597,16 @@
           <inkml:channelProperty channel="Y" name="resolution" value="1000" units="1/cm"/>
         </inkml:channelProperties>
       </inkml:inkSource>
-      <inkml:timestamp xml:id="ts0" timeString="2021-02-18T10:20:52.053"/>
+      <inkml:timestamp xml:id="ts0" timeString="2021-02-21T03:35:32.634"/>
     </inkml:context>
     <inkml:brush xml:id="br0">
-      <inkml:brushProperty name="width" value="0.2" units="cm"/>
-      <inkml:brushProperty name="height" value="0.2" units="cm"/>
-      <inkml:brushProperty name="color" value="#33CCFF"/>
+      <inkml:brushProperty name="width" value="0.1" units="cm"/>
+      <inkml:brushProperty name="height" value="0.1" units="cm"/>
+      <inkml:brushProperty name="color" value="#00A0D7"/>
       <inkml:brushProperty name="ignorePressure" value="1"/>
     </inkml:brush>
   </inkml:definitions>
-  <inkml:trace contextRef="#ctx0" brushRef="#br0">0 31,'0'-30,"0"51,0-12,0-9</inkml:trace>
+  <inkml:trace contextRef="#ctx0" brushRef="#br0">0 104,'0'1694,"0"-3475,0 1765</inkml:trace>
 </inkml:ink>
 </file>
 
@@ -936,16 +624,16 @@
           <inkml:channelProperty channel="Y" name="resolution" value="1000" units="1/cm"/>
         </inkml:channelProperties>
       </inkml:inkSource>
-      <inkml:timestamp xml:id="ts0" timeString="2021-02-18T10:21:03.561"/>
+      <inkml:timestamp xml:id="ts0" timeString="2021-02-21T03:36:22.035"/>
     </inkml:context>
     <inkml:brush xml:id="br0">
-      <inkml:brushProperty name="width" value="0.2" units="cm"/>
-      <inkml:brushProperty name="height" value="0.2" units="cm"/>
-      <inkml:brushProperty name="color" value="#33CCFF"/>
+      <inkml:brushProperty name="width" value="0.1" units="cm"/>
+      <inkml:brushProperty name="height" value="0.1" units="cm"/>
+      <inkml:brushProperty name="color" value="#00A0D7"/>
       <inkml:brushProperty name="ignorePressure" value="1"/>
     </inkml:brush>
   </inkml:definitions>
-  <inkml:trace contextRef="#ctx0" brushRef="#br0">1 2141,'0'3167,"0"-8463,0 5284</inkml:trace>
+  <inkml:trace contextRef="#ctx0" brushRef="#br0">0 0</inkml:trace>
 </inkml:ink>
 </file>
 
@@ -1096,7 +784,7 @@
           <a:p>
             <a:fld id="{847CBE49-6192-4EBB-A949-B356A0256A5C}" type="datetimeFigureOut">
               <a:rPr lang="en-US" smtClean="0"/>
-              <a:t>2/19/2021</a:t>
+              <a:t>2/20/2021</a:t>
             </a:fld>
             <a:endParaRPr lang="en-US"/>
           </a:p>
@@ -1294,7 +982,7 @@
           <a:p>
             <a:fld id="{847CBE49-6192-4EBB-A949-B356A0256A5C}" type="datetimeFigureOut">
               <a:rPr lang="en-US" smtClean="0"/>
-              <a:t>2/19/2021</a:t>
+              <a:t>2/20/2021</a:t>
             </a:fld>
             <a:endParaRPr lang="en-US"/>
           </a:p>
@@ -1502,7 +1190,7 @@
           <a:p>
             <a:fld id="{847CBE49-6192-4EBB-A949-B356A0256A5C}" type="datetimeFigureOut">
               <a:rPr lang="en-US" smtClean="0"/>
-              <a:t>2/19/2021</a:t>
+              <a:t>2/20/2021</a:t>
             </a:fld>
             <a:endParaRPr lang="en-US"/>
           </a:p>
@@ -1700,7 +1388,7 @@
           <a:p>
             <a:fld id="{847CBE49-6192-4EBB-A949-B356A0256A5C}" type="datetimeFigureOut">
               <a:rPr lang="en-US" smtClean="0"/>
-              <a:t>2/19/2021</a:t>
+              <a:t>2/20/2021</a:t>
             </a:fld>
             <a:endParaRPr lang="en-US"/>
           </a:p>
@@ -1975,7 +1663,7 @@
           <a:p>
             <a:fld id="{847CBE49-6192-4EBB-A949-B356A0256A5C}" type="datetimeFigureOut">
               <a:rPr lang="en-US" smtClean="0"/>
-              <a:t>2/19/2021</a:t>
+              <a:t>2/20/2021</a:t>
             </a:fld>
             <a:endParaRPr lang="en-US"/>
           </a:p>
@@ -2240,7 +1928,7 @@
           <a:p>
             <a:fld id="{847CBE49-6192-4EBB-A949-B356A0256A5C}" type="datetimeFigureOut">
               <a:rPr lang="en-US" smtClean="0"/>
-              <a:t>2/19/2021</a:t>
+              <a:t>2/20/2021</a:t>
             </a:fld>
             <a:endParaRPr lang="en-US"/>
           </a:p>
@@ -2652,7 +2340,7 @@
           <a:p>
             <a:fld id="{847CBE49-6192-4EBB-A949-B356A0256A5C}" type="datetimeFigureOut">
               <a:rPr lang="en-US" smtClean="0"/>
-              <a:t>2/19/2021</a:t>
+              <a:t>2/20/2021</a:t>
             </a:fld>
             <a:endParaRPr lang="en-US"/>
           </a:p>
@@ -2793,7 +2481,7 @@
           <a:p>
             <a:fld id="{847CBE49-6192-4EBB-A949-B356A0256A5C}" type="datetimeFigureOut">
               <a:rPr lang="en-US" smtClean="0"/>
-              <a:t>2/19/2021</a:t>
+              <a:t>2/20/2021</a:t>
             </a:fld>
             <a:endParaRPr lang="en-US"/>
           </a:p>
@@ -2906,7 +2594,7 @@
           <a:p>
             <a:fld id="{847CBE49-6192-4EBB-A949-B356A0256A5C}" type="datetimeFigureOut">
               <a:rPr lang="en-US" smtClean="0"/>
-              <a:t>2/19/2021</a:t>
+              <a:t>2/20/2021</a:t>
             </a:fld>
             <a:endParaRPr lang="en-US"/>
           </a:p>
@@ -3217,7 +2905,7 @@
           <a:p>
             <a:fld id="{847CBE49-6192-4EBB-A949-B356A0256A5C}" type="datetimeFigureOut">
               <a:rPr lang="en-US" smtClean="0"/>
-              <a:t>2/19/2021</a:t>
+              <a:t>2/20/2021</a:t>
             </a:fld>
             <a:endParaRPr lang="en-US"/>
           </a:p>
@@ -3505,7 +3193,7 @@
           <a:p>
             <a:fld id="{847CBE49-6192-4EBB-A949-B356A0256A5C}" type="datetimeFigureOut">
               <a:rPr lang="en-US" smtClean="0"/>
-              <a:t>2/19/2021</a:t>
+              <a:t>2/20/2021</a:t>
             </a:fld>
             <a:endParaRPr lang="en-US"/>
           </a:p>
@@ -3746,7 +3434,7 @@
           <a:p>
             <a:fld id="{847CBE49-6192-4EBB-A949-B356A0256A5C}" type="datetimeFigureOut">
               <a:rPr lang="en-US" smtClean="0"/>
-              <a:t>2/19/2021</a:t>
+              <a:t>2/20/2021</a:t>
             </a:fld>
             <a:endParaRPr lang="en-US"/>
           </a:p>
@@ -4323,35 +4011,6 @@
           </a:prstGeom>
         </p:spPr>
       </p:pic>
-      <p:pic>
-        <p:nvPicPr>
-          <p:cNvPr id="7" name="Picture 6">
-            <a:extLst>
-              <a:ext uri="{FF2B5EF4-FFF2-40B4-BE49-F238E27FC236}">
-                <a16:creationId xmlns:a16="http://schemas.microsoft.com/office/drawing/2014/main" id="{8F87405F-21D0-4A81-94CB-FBCACE6594BE}"/>
-              </a:ext>
-            </a:extLst>
-          </p:cNvPr>
-          <p:cNvPicPr>
-            <a:picLocks noChangeAspect="1"/>
-          </p:cNvPicPr>
-          <p:nvPr/>
-        </p:nvPicPr>
-        <p:blipFill rotWithShape="1">
-          <a:blip r:embed="rId5"/>
-          <a:srcRect l="1765" t="3099" r="2156" b="1759"/>
-          <a:stretch/>
-        </p:blipFill>
-        <p:spPr>
-          <a:xfrm rot="16200000">
-            <a:off x="240458" y="1146691"/>
-            <a:ext cx="2542741" cy="1473752"/>
-          </a:xfrm>
-          <a:prstGeom prst="rect">
-            <a:avLst/>
-          </a:prstGeom>
-        </p:spPr>
-      </p:pic>
       <p:sp>
         <p:nvSpPr>
           <p:cNvPr id="23" name="Freeform: Shape 22">
@@ -5999,13 +5658,13 @@
           <p:nvPr/>
         </p:nvPicPr>
         <p:blipFill>
-          <a:blip r:embed="rId6">
+          <a:blip r:embed="rId5">
             <a:extLst>
               <a:ext uri="{28A0092B-C50C-407E-A947-70E740481C1C}">
                 <a14:useLocalDpi xmlns:a14="http://schemas.microsoft.com/office/drawing/2010/main" val="0"/>
               </a:ext>
               <a:ext uri="{96DAC541-7B7A-43D3-8B79-37D633B846F1}">
-                <asvg:svgBlip xmlns:asvg="http://schemas.microsoft.com/office/drawing/2016/SVG/main" r:embed="rId7"/>
+                <asvg:svgBlip xmlns:asvg="http://schemas.microsoft.com/office/drawing/2016/SVG/main" r:embed="rId6"/>
               </a:ext>
             </a:extLst>
           </a:blip>
@@ -6038,13 +5697,13 @@
           <p:nvPr/>
         </p:nvPicPr>
         <p:blipFill>
-          <a:blip r:embed="rId8">
+          <a:blip r:embed="rId7">
             <a:extLst>
               <a:ext uri="{28A0092B-C50C-407E-A947-70E740481C1C}">
                 <a14:useLocalDpi xmlns:a14="http://schemas.microsoft.com/office/drawing/2010/main" val="0"/>
               </a:ext>
               <a:ext uri="{96DAC541-7B7A-43D3-8B79-37D633B846F1}">
-                <asvg:svgBlip xmlns:asvg="http://schemas.microsoft.com/office/drawing/2016/SVG/main" r:embed="rId9"/>
+                <asvg:svgBlip xmlns:asvg="http://schemas.microsoft.com/office/drawing/2016/SVG/main" r:embed="rId8"/>
               </a:ext>
             </a:extLst>
           </a:blip>
@@ -6077,13 +5736,13 @@
           <p:nvPr/>
         </p:nvPicPr>
         <p:blipFill>
-          <a:blip r:embed="rId8">
+          <a:blip r:embed="rId7">
             <a:extLst>
               <a:ext uri="{28A0092B-C50C-407E-A947-70E740481C1C}">
                 <a14:useLocalDpi xmlns:a14="http://schemas.microsoft.com/office/drawing/2010/main" val="0"/>
               </a:ext>
               <a:ext uri="{96DAC541-7B7A-43D3-8B79-37D633B846F1}">
-                <asvg:svgBlip xmlns:asvg="http://schemas.microsoft.com/office/drawing/2016/SVG/main" r:embed="rId9"/>
+                <asvg:svgBlip xmlns:asvg="http://schemas.microsoft.com/office/drawing/2016/SVG/main" r:embed="rId8"/>
               </a:ext>
             </a:extLst>
           </a:blip>
@@ -6291,13 +5950,13 @@
           <p:nvPr/>
         </p:nvPicPr>
         <p:blipFill>
-          <a:blip r:embed="rId6">
+          <a:blip r:embed="rId5">
             <a:extLst>
               <a:ext uri="{28A0092B-C50C-407E-A947-70E740481C1C}">
                 <a14:useLocalDpi xmlns:a14="http://schemas.microsoft.com/office/drawing/2010/main" val="0"/>
               </a:ext>
               <a:ext uri="{96DAC541-7B7A-43D3-8B79-37D633B846F1}">
-                <asvg:svgBlip xmlns:asvg="http://schemas.microsoft.com/office/drawing/2016/SVG/main" r:embed="rId7"/>
+                <asvg:svgBlip xmlns:asvg="http://schemas.microsoft.com/office/drawing/2016/SVG/main" r:embed="rId6"/>
               </a:ext>
             </a:extLst>
           </a:blip>
@@ -6429,13 +6088,13 @@
           <p:nvPr/>
         </p:nvPicPr>
         <p:blipFill>
-          <a:blip r:embed="rId10">
+          <a:blip r:embed="rId9">
             <a:extLst>
               <a:ext uri="{28A0092B-C50C-407E-A947-70E740481C1C}">
                 <a14:useLocalDpi xmlns:a14="http://schemas.microsoft.com/office/drawing/2010/main" val="0"/>
               </a:ext>
               <a:ext uri="{96DAC541-7B7A-43D3-8B79-37D633B846F1}">
-                <asvg:svgBlip xmlns:asvg="http://schemas.microsoft.com/office/drawing/2016/SVG/main" r:embed="rId11"/>
+                <asvg:svgBlip xmlns:asvg="http://schemas.microsoft.com/office/drawing/2016/SVG/main" r:embed="rId10"/>
               </a:ext>
             </a:extLst>
           </a:blip>
@@ -6468,13 +6127,13 @@
           <p:nvPr/>
         </p:nvPicPr>
         <p:blipFill>
-          <a:blip r:embed="rId10">
+          <a:blip r:embed="rId9">
             <a:extLst>
               <a:ext uri="{28A0092B-C50C-407E-A947-70E740481C1C}">
                 <a14:useLocalDpi xmlns:a14="http://schemas.microsoft.com/office/drawing/2010/main" val="0"/>
               </a:ext>
               <a:ext uri="{96DAC541-7B7A-43D3-8B79-37D633B846F1}">
-                <asvg:svgBlip xmlns:asvg="http://schemas.microsoft.com/office/drawing/2016/SVG/main" r:embed="rId11"/>
+                <asvg:svgBlip xmlns:asvg="http://schemas.microsoft.com/office/drawing/2016/SVG/main" r:embed="rId10"/>
               </a:ext>
             </a:extLst>
           </a:blip>
@@ -6492,35 +6151,6 @@
           </a:prstGeom>
         </p:spPr>
       </p:pic>
-      <p:pic>
-        <p:nvPicPr>
-          <p:cNvPr id="50" name="Picture 49">
-            <a:extLst>
-              <a:ext uri="{FF2B5EF4-FFF2-40B4-BE49-F238E27FC236}">
-                <a16:creationId xmlns:a16="http://schemas.microsoft.com/office/drawing/2014/main" id="{A96CFE84-4F8E-482D-82F6-2D918B0ED1E4}"/>
-              </a:ext>
-            </a:extLst>
-          </p:cNvPr>
-          <p:cNvPicPr>
-            <a:picLocks noChangeAspect="1"/>
-          </p:cNvPicPr>
-          <p:nvPr/>
-        </p:nvPicPr>
-        <p:blipFill rotWithShape="1">
-          <a:blip r:embed="rId5"/>
-          <a:srcRect l="1765" t="3099" r="2156" b="1759"/>
-          <a:stretch/>
-        </p:blipFill>
-        <p:spPr>
-          <a:xfrm rot="16200000">
-            <a:off x="9605952" y="3430396"/>
-            <a:ext cx="1038201" cy="601733"/>
-          </a:xfrm>
-          <a:prstGeom prst="rect">
-            <a:avLst/>
-          </a:prstGeom>
-        </p:spPr>
-      </p:pic>
       <p:sp>
         <p:nvSpPr>
           <p:cNvPr id="51" name="TextBox 50">
@@ -6536,7 +6166,7 @@
         <p:spPr>
           <a:xfrm>
             <a:off x="10851032" y="3206297"/>
-            <a:ext cx="1184870" cy="646331"/>
+            <a:ext cx="1184870" cy="923330"/>
           </a:xfrm>
           <a:prstGeom prst="rect">
             <a:avLst/>
@@ -6551,19 +6181,72 @@
           <a:p>
             <a:r>
               <a:rPr lang="en-US" dirty="0"/>
-              <a:t>Adafruit Trinket M0</a:t>
+              <a:t>Adafruit </a:t>
             </a:r>
-          </a:p>
-        </p:txBody>
-      </p:sp>
-      <mc:AlternateContent xmlns:mc="http://schemas.openxmlformats.org/markup-compatibility/2006" xmlns:p14="http://schemas.microsoft.com/office/powerpoint/2010/main">
-        <mc:Choice Requires="p14">
+            <a:r>
+              <a:rPr lang="en-US" dirty="0" err="1"/>
+              <a:t>ItsyBitsy</a:t>
+            </a:r>
+            <a:r>
+              <a:rPr lang="en-US" dirty="0"/>
+              <a:t> 32u4 5v</a:t>
+            </a:r>
+          </a:p>
+        </p:txBody>
+      </p:sp>
+      <p:pic>
+        <p:nvPicPr>
+          <p:cNvPr id="63" name="Picture 2" descr="Image result for itsybitsy 32u4 5v fritzing">
+            <a:extLst>
+              <a:ext uri="{FF2B5EF4-FFF2-40B4-BE49-F238E27FC236}">
+                <a16:creationId xmlns:a16="http://schemas.microsoft.com/office/drawing/2014/main" id="{D6AF194C-BE9F-481E-A26A-E80E98A6C7A2}"/>
+              </a:ext>
+            </a:extLst>
+          </p:cNvPr>
+          <p:cNvPicPr>
+            <a:picLocks noChangeAspect="1" noChangeArrowheads="1"/>
+          </p:cNvPicPr>
+          <p:nvPr/>
+        </p:nvPicPr>
+        <p:blipFill rotWithShape="1">
+          <a:blip r:embed="rId11">
+            <a:extLst>
+              <a:ext uri="{28A0092B-C50C-407E-A947-70E740481C1C}">
+                <a14:useLocalDpi xmlns:a14="http://schemas.microsoft.com/office/drawing/2010/main" val="0"/>
+              </a:ext>
+            </a:extLst>
+          </a:blip>
+          <a:srcRect l="11200" t="25067" r="12000" b="23200"/>
+          <a:stretch/>
+        </p:blipFill>
+        <p:spPr bwMode="auto">
+          <a:xfrm rot="5400000">
+            <a:off x="-692683" y="1362038"/>
+            <a:ext cx="4088593" cy="2065591"/>
+          </a:xfrm>
+          <a:prstGeom prst="rect">
+            <a:avLst/>
+          </a:prstGeom>
+          <a:noFill/>
+          <a:extLst>
+            <a:ext uri="{909E8E84-426E-40DD-AFC4-6F175D3DCCD1}">
+              <a14:hiddenFill xmlns:a14="http://schemas.microsoft.com/office/drawing/2010/main">
+                <a:solidFill>
+                  <a:srgbClr val="FFFFFF"/>
+                </a:solidFill>
+              </a14:hiddenFill>
+            </a:ext>
+          </a:extLst>
+        </p:spPr>
+      </p:pic>
+      <mc:AlternateContent xmlns:mc="http://schemas.openxmlformats.org/markup-compatibility/2006">
+        <mc:Choice xmlns:p14="http://schemas.microsoft.com/office/powerpoint/2010/main" Requires="p14">
           <p:contentPart p14:bwMode="auto" r:id="rId12">
             <p14:nvContentPartPr>
-              <p14:cNvPr id="68" name="Ink 67">
+              <p14:cNvPr id="6" name="Ink 5">
                 <a:extLst>
                   <a:ext uri="{FF2B5EF4-FFF2-40B4-BE49-F238E27FC236}">
-                    <a16:creationId xmlns:a16="http://schemas.microsoft.com/office/drawing/2014/main" id="{A621CB1F-0806-475D-A429-503E3C25BE78}"/>
+                    <a16:creationId xmlns:a16="http://schemas.microsoft.com/office/drawing/2014/main" id="{2D908692-74E0-44EF-BE26-D2F567E75EE9}"/>
                   </a:ext>
                 </a:extLst>
               </p14:cNvPr>
@@ -6571,18 +6254,18 @@
               <p14:nvPr/>
             </p14:nvContentPartPr>
             <p14:xfrm>
-              <a:off x="468544" y="376585"/>
-              <a:ext cx="5262120" cy="360"/>
+              <a:off x="235920" y="155700"/>
+              <a:ext cx="6172920" cy="360"/>
             </p14:xfrm>
           </p:contentPart>
         </mc:Choice>
-        <mc:Fallback xmlns="">
+        <mc:Fallback>
           <p:pic>
             <p:nvPicPr>
-              <p:cNvPr id="68" name="Ink 67">
+              <p:cNvPr id="6" name="Ink 5">
                 <a:extLst>
                   <a:ext uri="{FF2B5EF4-FFF2-40B4-BE49-F238E27FC236}">
-                    <a16:creationId xmlns:a16="http://schemas.microsoft.com/office/drawing/2014/main" id="{A621CB1F-0806-475D-A429-503E3C25BE78}"/>
+                    <a16:creationId xmlns:a16="http://schemas.microsoft.com/office/drawing/2014/main" id="{2D908692-74E0-44EF-BE26-D2F567E75EE9}"/>
                   </a:ext>
                 </a:extLst>
               </p:cNvPr>
@@ -6597,8 +6280,8 @@
             </p:blipFill>
             <p:spPr>
               <a:xfrm>
-                <a:off x="432904" y="340585"/>
-                <a:ext cx="5333760" cy="72000"/>
+                <a:off x="217920" y="137700"/>
+                <a:ext cx="6208560" cy="36000"/>
               </a:xfrm>
               <a:prstGeom prst="rect">
                 <a:avLst/>
@@ -6607,14 +6290,14 @@
           </p:pic>
         </mc:Fallback>
       </mc:AlternateContent>
-      <mc:AlternateContent xmlns:mc="http://schemas.openxmlformats.org/markup-compatibility/2006" xmlns:p14="http://schemas.microsoft.com/office/powerpoint/2010/main">
-        <mc:Choice Requires="p14">
+      <mc:AlternateContent xmlns:mc="http://schemas.openxmlformats.org/markup-compatibility/2006">
+        <mc:Choice xmlns:p14="http://schemas.microsoft.com/office/powerpoint/2010/main" Requires="p14">
           <p:contentPart p14:bwMode="auto" r:id="rId14">
             <p14:nvContentPartPr>
-              <p14:cNvPr id="69" name="Ink 68">
+              <p14:cNvPr id="9" name="Ink 8">
                 <a:extLst>
                   <a:ext uri="{FF2B5EF4-FFF2-40B4-BE49-F238E27FC236}">
-                    <a16:creationId xmlns:a16="http://schemas.microsoft.com/office/drawing/2014/main" id="{824E0320-0309-4D82-B5FC-7E41797BEEFE}"/>
+                    <a16:creationId xmlns:a16="http://schemas.microsoft.com/office/drawing/2014/main" id="{D1841D56-3166-43A7-BB11-86932A642FFF}"/>
                   </a:ext>
                 </a:extLst>
               </p14:cNvPr>
@@ -6622,18 +6305,18 @@
               <p14:nvPr/>
             </p14:nvContentPartPr>
             <p14:xfrm>
-              <a:off x="6007864" y="425185"/>
-              <a:ext cx="360" cy="1758960"/>
+              <a:off x="192720" y="620820"/>
+              <a:ext cx="309600" cy="171720"/>
             </p14:xfrm>
           </p:contentPart>
         </mc:Choice>
-        <mc:Fallback xmlns="">
+        <mc:Fallback>
           <p:pic>
             <p:nvPicPr>
-              <p:cNvPr id="69" name="Ink 68">
+              <p:cNvPr id="9" name="Ink 8">
                 <a:extLst>
                   <a:ext uri="{FF2B5EF4-FFF2-40B4-BE49-F238E27FC236}">
-                    <a16:creationId xmlns:a16="http://schemas.microsoft.com/office/drawing/2014/main" id="{824E0320-0309-4D82-B5FC-7E41797BEEFE}"/>
+                    <a16:creationId xmlns:a16="http://schemas.microsoft.com/office/drawing/2014/main" id="{D1841D56-3166-43A7-BB11-86932A642FFF}"/>
                   </a:ext>
                 </a:extLst>
               </p:cNvPr>
@@ -6648,8 +6331,8 @@
             </p:blipFill>
             <p:spPr>
               <a:xfrm>
-                <a:off x="5971864" y="389185"/>
-                <a:ext cx="72000" cy="1830600"/>
+                <a:off x="174720" y="603180"/>
+                <a:ext cx="345240" cy="207360"/>
               </a:xfrm>
               <a:prstGeom prst="rect">
                 <a:avLst/>
@@ -6658,14 +6341,14 @@
           </p:pic>
         </mc:Fallback>
       </mc:AlternateContent>
-      <mc:AlternateContent xmlns:mc="http://schemas.openxmlformats.org/markup-compatibility/2006" xmlns:p14="http://schemas.microsoft.com/office/powerpoint/2010/main">
-        <mc:Choice Requires="p14">
+      <mc:AlternateContent xmlns:mc="http://schemas.openxmlformats.org/markup-compatibility/2006">
+        <mc:Choice xmlns:p14="http://schemas.microsoft.com/office/powerpoint/2010/main" Requires="p14">
           <p:contentPart p14:bwMode="auto" r:id="rId16">
             <p14:nvContentPartPr>
-              <p14:cNvPr id="70" name="Ink 69">
+              <p14:cNvPr id="10" name="Ink 9">
                 <a:extLst>
                   <a:ext uri="{FF2B5EF4-FFF2-40B4-BE49-F238E27FC236}">
-                    <a16:creationId xmlns:a16="http://schemas.microsoft.com/office/drawing/2014/main" id="{9A6D6FEA-595E-4FA8-9FD0-4E1C06AA989C}"/>
+                    <a16:creationId xmlns:a16="http://schemas.microsoft.com/office/drawing/2014/main" id="{D73E96B8-29FE-447D-ACF4-D0036EE12DDB}"/>
                   </a:ext>
                 </a:extLst>
               </p14:cNvPr>
@@ -6673,18 +6356,18 @@
               <p14:nvPr/>
             </p14:nvContentPartPr>
             <p14:xfrm>
-              <a:off x="531904" y="382345"/>
-              <a:ext cx="360" cy="1050120"/>
+              <a:off x="6367800" y="144540"/>
+              <a:ext cx="360" cy="2039760"/>
             </p14:xfrm>
           </p:contentPart>
         </mc:Choice>
-        <mc:Fallback xmlns="">
+        <mc:Fallback>
           <p:pic>
             <p:nvPicPr>
-              <p:cNvPr id="70" name="Ink 69">
+              <p:cNvPr id="10" name="Ink 9">
                 <a:extLst>
                   <a:ext uri="{FF2B5EF4-FFF2-40B4-BE49-F238E27FC236}">
-                    <a16:creationId xmlns:a16="http://schemas.microsoft.com/office/drawing/2014/main" id="{9A6D6FEA-595E-4FA8-9FD0-4E1C06AA989C}"/>
+                    <a16:creationId xmlns:a16="http://schemas.microsoft.com/office/drawing/2014/main" id="{D73E96B8-29FE-447D-ACF4-D0036EE12DDB}"/>
                   </a:ext>
                 </a:extLst>
               </p:cNvPr>
@@ -6699,8 +6382,8 @@
             </p:blipFill>
             <p:spPr>
               <a:xfrm>
-                <a:off x="496264" y="346705"/>
-                <a:ext cx="72000" cy="1121760"/>
+                <a:off x="6350160" y="126540"/>
+                <a:ext cx="36000" cy="2075400"/>
               </a:xfrm>
               <a:prstGeom prst="rect">
                 <a:avLst/>
@@ -6709,14 +6392,14 @@
           </p:pic>
         </mc:Fallback>
       </mc:AlternateContent>
-      <mc:AlternateContent xmlns:mc="http://schemas.openxmlformats.org/markup-compatibility/2006" xmlns:p14="http://schemas.microsoft.com/office/powerpoint/2010/main">
-        <mc:Choice Requires="p14">
+      <mc:AlternateContent xmlns:mc="http://schemas.openxmlformats.org/markup-compatibility/2006">
+        <mc:Choice xmlns:p14="http://schemas.microsoft.com/office/powerpoint/2010/main" Requires="p14">
           <p:contentPart p14:bwMode="auto" r:id="rId18">
             <p14:nvContentPartPr>
-              <p14:cNvPr id="72" name="Ink 71">
+              <p14:cNvPr id="11" name="Ink 10">
                 <a:extLst>
                   <a:ext uri="{FF2B5EF4-FFF2-40B4-BE49-F238E27FC236}">
-                    <a16:creationId xmlns:a16="http://schemas.microsoft.com/office/drawing/2014/main" id="{5C77BA8C-1712-454D-90B3-0E84C5A0748D}"/>
+                    <a16:creationId xmlns:a16="http://schemas.microsoft.com/office/drawing/2014/main" id="{76B95FB3-3578-4413-ABA5-A9EC0E883BA9}"/>
                   </a:ext>
                 </a:extLst>
               </p14:cNvPr>
@@ -6724,18 +6407,18 @@
               <p14:nvPr/>
             </p14:nvContentPartPr>
             <p14:xfrm>
-              <a:off x="5720224" y="371545"/>
-              <a:ext cx="275760" cy="23400"/>
+              <a:off x="96600" y="144540"/>
+              <a:ext cx="116640" cy="462600"/>
             </p14:xfrm>
           </p:contentPart>
         </mc:Choice>
-        <mc:Fallback xmlns="">
+        <mc:Fallback>
           <p:pic>
             <p:nvPicPr>
-              <p:cNvPr id="72" name="Ink 71">
+              <p:cNvPr id="11" name="Ink 10">
                 <a:extLst>
                   <a:ext uri="{FF2B5EF4-FFF2-40B4-BE49-F238E27FC236}">
-                    <a16:creationId xmlns:a16="http://schemas.microsoft.com/office/drawing/2014/main" id="{5C77BA8C-1712-454D-90B3-0E84C5A0748D}"/>
+                    <a16:creationId xmlns:a16="http://schemas.microsoft.com/office/drawing/2014/main" id="{76B95FB3-3578-4413-ABA5-A9EC0E883BA9}"/>
                   </a:ext>
                 </a:extLst>
               </p:cNvPr>
@@ -6750,8 +6433,8 @@
             </p:blipFill>
             <p:spPr>
               <a:xfrm>
-                <a:off x="5684224" y="335905"/>
-                <a:ext cx="347400" cy="95040"/>
+                <a:off x="78960" y="126540"/>
+                <a:ext cx="152280" cy="498240"/>
               </a:xfrm>
               <a:prstGeom prst="rect">
                 <a:avLst/>
@@ -6760,14 +6443,14 @@
           </p:pic>
         </mc:Fallback>
       </mc:AlternateContent>
-      <mc:AlternateContent xmlns:mc="http://schemas.openxmlformats.org/markup-compatibility/2006" xmlns:p14="http://schemas.microsoft.com/office/powerpoint/2010/main">
-        <mc:Choice Requires="p14">
+      <mc:AlternateContent xmlns:mc="http://schemas.openxmlformats.org/markup-compatibility/2006">
+        <mc:Choice xmlns:p14="http://schemas.microsoft.com/office/powerpoint/2010/main" Requires="p14">
           <p:contentPart p14:bwMode="auto" r:id="rId20">
             <p14:nvContentPartPr>
-              <p14:cNvPr id="73" name="Ink 72">
+              <p14:cNvPr id="12" name="Ink 11">
                 <a:extLst>
                   <a:ext uri="{FF2B5EF4-FFF2-40B4-BE49-F238E27FC236}">
-                    <a16:creationId xmlns:a16="http://schemas.microsoft.com/office/drawing/2014/main" id="{E03D8419-D83A-4719-85D4-45C8A641036E}"/>
+                    <a16:creationId xmlns:a16="http://schemas.microsoft.com/office/drawing/2014/main" id="{C032CE02-F863-457E-B2D6-7BF4EA92B19F}"/>
                   </a:ext>
                 </a:extLst>
               </p14:cNvPr>
@@ -6775,18 +6458,18 @@
               <p14:nvPr/>
             </p14:nvContentPartPr>
             <p14:xfrm>
-              <a:off x="520744" y="1360465"/>
-              <a:ext cx="403200" cy="330120"/>
+              <a:off x="2224920" y="783540"/>
+              <a:ext cx="3771000" cy="360"/>
             </p14:xfrm>
           </p:contentPart>
         </mc:Choice>
-        <mc:Fallback xmlns="">
+        <mc:Fallback>
           <p:pic>
             <p:nvPicPr>
-              <p:cNvPr id="73" name="Ink 72">
+              <p:cNvPr id="12" name="Ink 11">
                 <a:extLst>
                   <a:ext uri="{FF2B5EF4-FFF2-40B4-BE49-F238E27FC236}">
-                    <a16:creationId xmlns:a16="http://schemas.microsoft.com/office/drawing/2014/main" id="{E03D8419-D83A-4719-85D4-45C8A641036E}"/>
+                    <a16:creationId xmlns:a16="http://schemas.microsoft.com/office/drawing/2014/main" id="{C032CE02-F863-457E-B2D6-7BF4EA92B19F}"/>
                   </a:ext>
                 </a:extLst>
               </p:cNvPr>
@@ -6801,8 +6484,8 @@
             </p:blipFill>
             <p:spPr>
               <a:xfrm>
-                <a:off x="485104" y="1324825"/>
-                <a:ext cx="474840" cy="401760"/>
+                <a:off x="2206920" y="765900"/>
+                <a:ext cx="3806640" cy="36000"/>
               </a:xfrm>
               <a:prstGeom prst="rect">
                 <a:avLst/>
@@ -6811,14 +6494,14 @@
           </p:pic>
         </mc:Fallback>
       </mc:AlternateContent>
-      <mc:AlternateContent xmlns:mc="http://schemas.openxmlformats.org/markup-compatibility/2006" xmlns:p14="http://schemas.microsoft.com/office/powerpoint/2010/main">
-        <mc:Choice Requires="p14">
+      <mc:AlternateContent xmlns:mc="http://schemas.openxmlformats.org/markup-compatibility/2006">
+        <mc:Choice xmlns:p14="http://schemas.microsoft.com/office/powerpoint/2010/main" Requires="p14">
           <p:contentPart p14:bwMode="auto" r:id="rId22">
             <p14:nvContentPartPr>
-              <p14:cNvPr id="74" name="Ink 73">
+              <p14:cNvPr id="13" name="Ink 12">
                 <a:extLst>
                   <a:ext uri="{FF2B5EF4-FFF2-40B4-BE49-F238E27FC236}">
-                    <a16:creationId xmlns:a16="http://schemas.microsoft.com/office/drawing/2014/main" id="{C9A1F880-AE16-46FD-A1D7-AFD251393A49}"/>
+                    <a16:creationId xmlns:a16="http://schemas.microsoft.com/office/drawing/2014/main" id="{E9EE52CC-E3CA-42DA-B594-2C3FE9731397}"/>
                   </a:ext>
                 </a:extLst>
               </p14:cNvPr>
@@ -6826,18 +6509,18 @@
               <p14:nvPr/>
             </p14:nvContentPartPr>
             <p14:xfrm>
-              <a:off x="362160" y="368020"/>
-              <a:ext cx="360" cy="1569600"/>
+              <a:off x="5993400" y="784620"/>
+              <a:ext cx="360" cy="1404720"/>
             </p14:xfrm>
           </p:contentPart>
         </mc:Choice>
-        <mc:Fallback xmlns="">
+        <mc:Fallback>
           <p:pic>
             <p:nvPicPr>
-              <p:cNvPr id="74" name="Ink 73">
+              <p:cNvPr id="13" name="Ink 12">
                 <a:extLst>
                   <a:ext uri="{FF2B5EF4-FFF2-40B4-BE49-F238E27FC236}">
-                    <a16:creationId xmlns:a16="http://schemas.microsoft.com/office/drawing/2014/main" id="{C9A1F880-AE16-46FD-A1D7-AFD251393A49}"/>
+                    <a16:creationId xmlns:a16="http://schemas.microsoft.com/office/drawing/2014/main" id="{E9EE52CC-E3CA-42DA-B594-2C3FE9731397}"/>
                   </a:ext>
                 </a:extLst>
               </p:cNvPr>
@@ -6852,8 +6535,8 @@
             </p:blipFill>
             <p:spPr>
               <a:xfrm>
-                <a:off x="326160" y="332380"/>
-                <a:ext cx="72000" cy="1641240"/>
+                <a:off x="5975400" y="766620"/>
+                <a:ext cx="36000" cy="1440360"/>
               </a:xfrm>
               <a:prstGeom prst="rect">
                 <a:avLst/>
@@ -6862,14 +6545,14 @@
           </p:pic>
         </mc:Fallback>
       </mc:AlternateContent>
-      <mc:AlternateContent xmlns:mc="http://schemas.openxmlformats.org/markup-compatibility/2006" xmlns:p14="http://schemas.microsoft.com/office/powerpoint/2010/main">
-        <mc:Choice Requires="p14">
+      <mc:AlternateContent xmlns:mc="http://schemas.openxmlformats.org/markup-compatibility/2006">
+        <mc:Choice xmlns:p14="http://schemas.microsoft.com/office/powerpoint/2010/main" Requires="p14">
           <p:contentPart p14:bwMode="auto" r:id="rId24">
             <p14:nvContentPartPr>
-              <p14:cNvPr id="75" name="Ink 74">
+              <p14:cNvPr id="15" name="Ink 14">
                 <a:extLst>
                   <a:ext uri="{FF2B5EF4-FFF2-40B4-BE49-F238E27FC236}">
-                    <a16:creationId xmlns:a16="http://schemas.microsoft.com/office/drawing/2014/main" id="{9FE5DA45-6047-4CA7-B8A8-9D6B4E948693}"/>
+                    <a16:creationId xmlns:a16="http://schemas.microsoft.com/office/drawing/2014/main" id="{08D28E69-3A37-45E1-AD8C-C10ABF0C653E}"/>
                   </a:ext>
                 </a:extLst>
               </p14:cNvPr>
@@ -6877,18 +6560,18 @@
               <p14:nvPr/>
             </p14:nvContentPartPr>
             <p14:xfrm>
-              <a:off x="362160" y="208540"/>
-              <a:ext cx="360" cy="1810080"/>
+              <a:off x="6261240" y="1226700"/>
+              <a:ext cx="360" cy="921960"/>
             </p14:xfrm>
           </p:contentPart>
         </mc:Choice>
-        <mc:Fallback xmlns="">
+        <mc:Fallback>
           <p:pic>
             <p:nvPicPr>
-              <p:cNvPr id="75" name="Ink 74">
+              <p:cNvPr id="15" name="Ink 14">
                 <a:extLst>
                   <a:ext uri="{FF2B5EF4-FFF2-40B4-BE49-F238E27FC236}">
-                    <a16:creationId xmlns:a16="http://schemas.microsoft.com/office/drawing/2014/main" id="{9FE5DA45-6047-4CA7-B8A8-9D6B4E948693}"/>
+                    <a16:creationId xmlns:a16="http://schemas.microsoft.com/office/drawing/2014/main" id="{08D28E69-3A37-45E1-AD8C-C10ABF0C653E}"/>
                   </a:ext>
                 </a:extLst>
               </p:cNvPr>
@@ -6903,8 +6586,8 @@
             </p:blipFill>
             <p:spPr>
               <a:xfrm>
-                <a:off x="326160" y="172540"/>
-                <a:ext cx="72000" cy="1881720"/>
+                <a:off x="6243240" y="1209060"/>
+                <a:ext cx="36000" cy="957600"/>
               </a:xfrm>
               <a:prstGeom prst="rect">
                 <a:avLst/>
@@ -6913,14 +6596,14 @@
           </p:pic>
         </mc:Fallback>
       </mc:AlternateContent>
-      <mc:AlternateContent xmlns:mc="http://schemas.openxmlformats.org/markup-compatibility/2006" xmlns:p14="http://schemas.microsoft.com/office/powerpoint/2010/main">
-        <mc:Choice Requires="p14">
+      <mc:AlternateContent xmlns:mc="http://schemas.openxmlformats.org/markup-compatibility/2006">
+        <mc:Choice xmlns:p14="http://schemas.microsoft.com/office/powerpoint/2010/main" Requires="p14">
           <p:contentPart p14:bwMode="auto" r:id="rId26">
             <p14:nvContentPartPr>
-              <p14:cNvPr id="76" name="Ink 75">
+              <p14:cNvPr id="19" name="Ink 18">
                 <a:extLst>
                   <a:ext uri="{FF2B5EF4-FFF2-40B4-BE49-F238E27FC236}">
-                    <a16:creationId xmlns:a16="http://schemas.microsoft.com/office/drawing/2014/main" id="{D9D5AD0A-4EA9-48A7-A421-3BA5C417A67F}"/>
+                    <a16:creationId xmlns:a16="http://schemas.microsoft.com/office/drawing/2014/main" id="{4CF0EA05-4F70-456D-9B9E-BA7D91F716BC}"/>
                   </a:ext>
                 </a:extLst>
               </p14:cNvPr>
@@ -6928,18 +6611,18 @@
               <p14:nvPr/>
             </p14:nvContentPartPr>
             <p14:xfrm>
-              <a:off x="362160" y="1919260"/>
-              <a:ext cx="360" cy="11160"/>
+              <a:off x="6119760" y="1516860"/>
+              <a:ext cx="360" cy="647280"/>
             </p14:xfrm>
           </p:contentPart>
         </mc:Choice>
-        <mc:Fallback xmlns="">
+        <mc:Fallback>
           <p:pic>
             <p:nvPicPr>
-              <p:cNvPr id="76" name="Ink 75">
+              <p:cNvPr id="19" name="Ink 18">
                 <a:extLst>
                   <a:ext uri="{FF2B5EF4-FFF2-40B4-BE49-F238E27FC236}">
-                    <a16:creationId xmlns:a16="http://schemas.microsoft.com/office/drawing/2014/main" id="{D9D5AD0A-4EA9-48A7-A421-3BA5C417A67F}"/>
+                    <a16:creationId xmlns:a16="http://schemas.microsoft.com/office/drawing/2014/main" id="{4CF0EA05-4F70-456D-9B9E-BA7D91F716BC}"/>
                   </a:ext>
                 </a:extLst>
               </p:cNvPr>
@@ -6954,8 +6637,8 @@
             </p:blipFill>
             <p:spPr>
               <a:xfrm>
-                <a:off x="326160" y="1883620"/>
-                <a:ext cx="72000" cy="82800"/>
+                <a:off x="6101760" y="1499220"/>
+                <a:ext cx="36000" cy="682920"/>
               </a:xfrm>
               <a:prstGeom prst="rect">
                 <a:avLst/>
@@ -6964,14 +6647,14 @@
           </p:pic>
         </mc:Fallback>
       </mc:AlternateContent>
-      <mc:AlternateContent xmlns:mc="http://schemas.openxmlformats.org/markup-compatibility/2006" xmlns:p14="http://schemas.microsoft.com/office/powerpoint/2010/main">
-        <mc:Choice Requires="p14">
+      <mc:AlternateContent xmlns:mc="http://schemas.openxmlformats.org/markup-compatibility/2006">
+        <mc:Choice xmlns:p14="http://schemas.microsoft.com/office/powerpoint/2010/main" Requires="p14">
           <p:contentPart p14:bwMode="auto" r:id="rId28">
             <p14:nvContentPartPr>
-              <p14:cNvPr id="77" name="Ink 76">
+              <p14:cNvPr id="20" name="Ink 19">
                 <a:extLst>
                   <a:ext uri="{FF2B5EF4-FFF2-40B4-BE49-F238E27FC236}">
-                    <a16:creationId xmlns:a16="http://schemas.microsoft.com/office/drawing/2014/main" id="{00893063-EEA8-49D8-9FFE-74EBA29385F4}"/>
+                    <a16:creationId xmlns:a16="http://schemas.microsoft.com/office/drawing/2014/main" id="{FD4F7243-4821-4AE4-B3C5-A144310653FF}"/>
                   </a:ext>
                 </a:extLst>
               </p14:cNvPr>
@@ -6979,18 +6662,18 @@
               <p14:nvPr/>
             </p14:nvContentPartPr>
             <p14:xfrm>
-              <a:off x="6127920" y="245260"/>
-              <a:ext cx="360" cy="1911240"/>
+              <a:off x="13403280" y="251100"/>
+              <a:ext cx="360" cy="360"/>
             </p14:xfrm>
           </p:contentPart>
         </mc:Choice>
-        <mc:Fallback xmlns="">
+        <mc:Fallback>
           <p:pic>
             <p:nvPicPr>
-              <p:cNvPr id="77" name="Ink 76">
+              <p:cNvPr id="20" name="Ink 19">
                 <a:extLst>
                   <a:ext uri="{FF2B5EF4-FFF2-40B4-BE49-F238E27FC236}">
-                    <a16:creationId xmlns:a16="http://schemas.microsoft.com/office/drawing/2014/main" id="{00893063-EEA8-49D8-9FFE-74EBA29385F4}"/>
+                    <a16:creationId xmlns:a16="http://schemas.microsoft.com/office/drawing/2014/main" id="{FD4F7243-4821-4AE4-B3C5-A144310653FF}"/>
                   </a:ext>
                 </a:extLst>
               </p:cNvPr>
@@ -7005,8 +6688,8 @@
             </p:blipFill>
             <p:spPr>
               <a:xfrm>
-                <a:off x="6092280" y="209260"/>
-                <a:ext cx="72000" cy="1982880"/>
+                <a:off x="13385280" y="233100"/>
+                <a:ext cx="36000" cy="36000"/>
               </a:xfrm>
               <a:prstGeom prst="rect">
                 <a:avLst/>
@@ -7015,14 +6698,59 @@
           </p:pic>
         </mc:Fallback>
       </mc:AlternateContent>
-      <mc:AlternateContent xmlns:mc="http://schemas.openxmlformats.org/markup-compatibility/2006" xmlns:p14="http://schemas.microsoft.com/office/powerpoint/2010/main">
-        <mc:Choice Requires="p14">
+      <p:pic>
+        <p:nvPicPr>
+          <p:cNvPr id="83" name="Picture 2" descr="Image result for itsybitsy 32u4 5v fritzing">
+            <a:extLst>
+              <a:ext uri="{FF2B5EF4-FFF2-40B4-BE49-F238E27FC236}">
+                <a16:creationId xmlns:a16="http://schemas.microsoft.com/office/drawing/2014/main" id="{283FD256-4D04-4D2A-A513-F95C199B4F01}"/>
+              </a:ext>
+            </a:extLst>
+          </p:cNvPr>
+          <p:cNvPicPr>
+            <a:picLocks noChangeAspect="1" noChangeArrowheads="1"/>
+          </p:cNvPicPr>
+          <p:nvPr/>
+        </p:nvPicPr>
+        <p:blipFill rotWithShape="1">
+          <a:blip r:embed="rId11">
+            <a:extLst>
+              <a:ext uri="{28A0092B-C50C-407E-A947-70E740481C1C}">
+                <a14:useLocalDpi xmlns:a14="http://schemas.microsoft.com/office/drawing/2010/main" val="0"/>
+              </a:ext>
+            </a:extLst>
+          </a:blip>
+          <a:srcRect l="11200" t="25067" r="12000" b="23200"/>
+          <a:stretch/>
+        </p:blipFill>
+        <p:spPr bwMode="auto">
+          <a:xfrm rot="5400000">
+            <a:off x="9452726" y="3446288"/>
+            <a:ext cx="1385233" cy="699831"/>
+          </a:xfrm>
+          <a:prstGeom prst="rect">
+            <a:avLst/>
+          </a:prstGeom>
+          <a:noFill/>
+          <a:extLst>
+            <a:ext uri="{909E8E84-426E-40DD-AFC4-6F175D3DCCD1}">
+              <a14:hiddenFill xmlns:a14="http://schemas.microsoft.com/office/drawing/2010/main">
+                <a:solidFill>
+                  <a:srgbClr val="FFFFFF"/>
+                </a:solidFill>
+              </a14:hiddenFill>
+            </a:ext>
+          </a:extLst>
+        </p:spPr>
+      </p:pic>
+      <mc:AlternateContent xmlns:mc="http://schemas.openxmlformats.org/markup-compatibility/2006">
+        <mc:Choice xmlns:p14="http://schemas.microsoft.com/office/powerpoint/2010/main" Requires="p14">
           <p:contentPart p14:bwMode="auto" r:id="rId30">
             <p14:nvContentPartPr>
-              <p14:cNvPr id="78" name="Ink 77">
+              <p14:cNvPr id="55" name="Ink 54">
                 <a:extLst>
                   <a:ext uri="{FF2B5EF4-FFF2-40B4-BE49-F238E27FC236}">
-                    <a16:creationId xmlns:a16="http://schemas.microsoft.com/office/drawing/2014/main" id="{6594CEE6-7E48-451E-83D2-5CEA11459B46}"/>
+                    <a16:creationId xmlns:a16="http://schemas.microsoft.com/office/drawing/2014/main" id="{6FFE4CC2-D8B9-4C7D-B9E5-BEAB698CBA47}"/>
                   </a:ext>
                 </a:extLst>
               </p14:cNvPr>
@@ -7030,18 +6758,18 @@
               <p14:nvPr/>
             </p14:nvContentPartPr>
             <p14:xfrm>
-              <a:off x="6255000" y="1231660"/>
-              <a:ext cx="360" cy="360"/>
+              <a:off x="2166600" y="3505860"/>
+              <a:ext cx="2043720" cy="509760"/>
             </p14:xfrm>
           </p:contentPart>
         </mc:Choice>
-        <mc:Fallback xmlns="">
+        <mc:Fallback>
           <p:pic>
             <p:nvPicPr>
-              <p:cNvPr id="78" name="Ink 77">
+              <p:cNvPr id="55" name="Ink 54">
                 <a:extLst>
                   <a:ext uri="{FF2B5EF4-FFF2-40B4-BE49-F238E27FC236}">
-                    <a16:creationId xmlns:a16="http://schemas.microsoft.com/office/drawing/2014/main" id="{6594CEE6-7E48-451E-83D2-5CEA11459B46}"/>
+                    <a16:creationId xmlns:a16="http://schemas.microsoft.com/office/drawing/2014/main" id="{6FFE4CC2-D8B9-4C7D-B9E5-BEAB698CBA47}"/>
                   </a:ext>
                 </a:extLst>
               </p:cNvPr>
@@ -7056,8 +6784,8 @@
             </p:blipFill>
             <p:spPr>
               <a:xfrm>
-                <a:off x="6219000" y="1196020"/>
-                <a:ext cx="72000" cy="72000"/>
+                <a:off x="2148960" y="3488220"/>
+                <a:ext cx="2079360" cy="545400"/>
               </a:xfrm>
               <a:prstGeom prst="rect">
                 <a:avLst/>
@@ -7066,14 +6794,14 @@
           </p:pic>
         </mc:Fallback>
       </mc:AlternateContent>
-      <mc:AlternateContent xmlns:mc="http://schemas.openxmlformats.org/markup-compatibility/2006" xmlns:p14="http://schemas.microsoft.com/office/powerpoint/2010/main">
-        <mc:Choice Requires="p14">
+      <mc:AlternateContent xmlns:mc="http://schemas.openxmlformats.org/markup-compatibility/2006">
+        <mc:Choice xmlns:p14="http://schemas.microsoft.com/office/powerpoint/2010/main" Requires="p14">
           <p:contentPart p14:bwMode="auto" r:id="rId32">
             <p14:nvContentPartPr>
-              <p14:cNvPr id="79" name="Ink 78">
+              <p14:cNvPr id="57" name="Ink 56">
                 <a:extLst>
                   <a:ext uri="{FF2B5EF4-FFF2-40B4-BE49-F238E27FC236}">
-                    <a16:creationId xmlns:a16="http://schemas.microsoft.com/office/drawing/2014/main" id="{4C2F1E7E-33B6-4274-BF81-2FCB295E4555}"/>
+                    <a16:creationId xmlns:a16="http://schemas.microsoft.com/office/drawing/2014/main" id="{197199E7-BFA0-404C-B449-1AFF45884C84}"/>
                   </a:ext>
                 </a:extLst>
               </p14:cNvPr>
@@ -7081,18 +6809,18 @@
               <p14:nvPr/>
             </p14:nvContentPartPr>
             <p14:xfrm>
-              <a:off x="6255000" y="122500"/>
-              <a:ext cx="360" cy="2052000"/>
+              <a:off x="4569600" y="790020"/>
+              <a:ext cx="360" cy="2356560"/>
             </p14:xfrm>
           </p:contentPart>
         </mc:Choice>
-        <mc:Fallback xmlns="">
+        <mc:Fallback>
           <p:pic>
             <p:nvPicPr>
-              <p:cNvPr id="79" name="Ink 78">
+              <p:cNvPr id="57" name="Ink 56">
                 <a:extLst>
                   <a:ext uri="{FF2B5EF4-FFF2-40B4-BE49-F238E27FC236}">
-                    <a16:creationId xmlns:a16="http://schemas.microsoft.com/office/drawing/2014/main" id="{4C2F1E7E-33B6-4274-BF81-2FCB295E4555}"/>
+                    <a16:creationId xmlns:a16="http://schemas.microsoft.com/office/drawing/2014/main" id="{197199E7-BFA0-404C-B449-1AFF45884C84}"/>
                   </a:ext>
                 </a:extLst>
               </p:cNvPr>
@@ -7107,8 +6835,8 @@
             </p:blipFill>
             <p:spPr>
               <a:xfrm>
-                <a:off x="6219000" y="86860"/>
-                <a:ext cx="72000" cy="2123640"/>
+                <a:off x="4551600" y="772380"/>
+                <a:ext cx="36000" cy="2392200"/>
               </a:xfrm>
               <a:prstGeom prst="rect">
                 <a:avLst/>
@@ -7117,14 +6845,14 @@
           </p:pic>
         </mc:Fallback>
       </mc:AlternateContent>
-      <mc:AlternateContent xmlns:mc="http://schemas.openxmlformats.org/markup-compatibility/2006" xmlns:p14="http://schemas.microsoft.com/office/powerpoint/2010/main">
-        <mc:Choice Requires="p14">
+      <mc:AlternateContent xmlns:mc="http://schemas.openxmlformats.org/markup-compatibility/2006">
+        <mc:Choice xmlns:p14="http://schemas.microsoft.com/office/powerpoint/2010/main" Requires="p14">
           <p:contentPart p14:bwMode="auto" r:id="rId34">
             <p14:nvContentPartPr>
-              <p14:cNvPr id="80" name="Ink 79">
+              <p14:cNvPr id="58" name="Ink 57">
                 <a:extLst>
                   <a:ext uri="{FF2B5EF4-FFF2-40B4-BE49-F238E27FC236}">
-                    <a16:creationId xmlns:a16="http://schemas.microsoft.com/office/drawing/2014/main" id="{69AECC7D-5A11-49DD-8B98-21B3DCD11046}"/>
+                    <a16:creationId xmlns:a16="http://schemas.microsoft.com/office/drawing/2014/main" id="{2397B83C-A5E5-4F98-945D-03AD37B70FCC}"/>
                   </a:ext>
                 </a:extLst>
               </p14:cNvPr>
@@ -7132,18 +6860,18 @@
               <p14:nvPr/>
             </p14:nvContentPartPr>
             <p14:xfrm>
-              <a:off x="235080" y="24940"/>
-              <a:ext cx="360" cy="2160000"/>
+              <a:off x="2240400" y="4350780"/>
+              <a:ext cx="333360" cy="1713600"/>
             </p14:xfrm>
           </p:contentPart>
         </mc:Choice>
-        <mc:Fallback xmlns="">
+        <mc:Fallback>
           <p:pic>
             <p:nvPicPr>
-              <p:cNvPr id="80" name="Ink 79">
+              <p:cNvPr id="58" name="Ink 57">
                 <a:extLst>
                   <a:ext uri="{FF2B5EF4-FFF2-40B4-BE49-F238E27FC236}">
-                    <a16:creationId xmlns:a16="http://schemas.microsoft.com/office/drawing/2014/main" id="{69AECC7D-5A11-49DD-8B98-21B3DCD11046}"/>
+                    <a16:creationId xmlns:a16="http://schemas.microsoft.com/office/drawing/2014/main" id="{2397B83C-A5E5-4F98-945D-03AD37B70FCC}"/>
                   </a:ext>
                 </a:extLst>
               </p:cNvPr>
@@ -7158,8 +6886,8 @@
             </p:blipFill>
             <p:spPr>
               <a:xfrm>
-                <a:off x="199440" y="-10700"/>
-                <a:ext cx="72000" cy="2231640"/>
+                <a:off x="2222760" y="4332780"/>
+                <a:ext cx="369000" cy="1749240"/>
               </a:xfrm>
               <a:prstGeom prst="rect">
                 <a:avLst/>
@@ -7168,14 +6896,14 @@
           </p:pic>
         </mc:Fallback>
       </mc:AlternateContent>
-      <mc:AlternateContent xmlns:mc="http://schemas.openxmlformats.org/markup-compatibility/2006" xmlns:p14="http://schemas.microsoft.com/office/powerpoint/2010/main">
-        <mc:Choice Requires="p14">
+      <mc:AlternateContent xmlns:mc="http://schemas.openxmlformats.org/markup-compatibility/2006">
+        <mc:Choice xmlns:p14="http://schemas.microsoft.com/office/powerpoint/2010/main" Requires="p14">
           <p:contentPart p14:bwMode="auto" r:id="rId36">
             <p14:nvContentPartPr>
-              <p14:cNvPr id="81" name="Ink 80">
+              <p14:cNvPr id="60" name="Ink 59">
                 <a:extLst>
                   <a:ext uri="{FF2B5EF4-FFF2-40B4-BE49-F238E27FC236}">
-                    <a16:creationId xmlns:a16="http://schemas.microsoft.com/office/drawing/2014/main" id="{845FDC36-BCF4-438A-ABF9-B1A533F27E7B}"/>
+                    <a16:creationId xmlns:a16="http://schemas.microsoft.com/office/drawing/2014/main" id="{81A3A65C-403C-4D05-8697-CE5DF8A0411F}"/>
                   </a:ext>
                 </a:extLst>
               </p14:cNvPr>
@@ -7183,18 +6911,18 @@
               <p14:nvPr/>
             </p14:nvContentPartPr>
             <p14:xfrm>
-              <a:off x="368280" y="206020"/>
-              <a:ext cx="5764320" cy="360"/>
+              <a:off x="2567640" y="6053580"/>
+              <a:ext cx="5066640" cy="360"/>
             </p14:xfrm>
           </p:contentPart>
         </mc:Choice>
-        <mc:Fallback xmlns="">
+        <mc:Fallback>
           <p:pic>
             <p:nvPicPr>
-              <p:cNvPr id="81" name="Ink 80">
+              <p:cNvPr id="60" name="Ink 59">
                 <a:extLst>
                   <a:ext uri="{FF2B5EF4-FFF2-40B4-BE49-F238E27FC236}">
-                    <a16:creationId xmlns:a16="http://schemas.microsoft.com/office/drawing/2014/main" id="{845FDC36-BCF4-438A-ABF9-B1A533F27E7B}"/>
+                    <a16:creationId xmlns:a16="http://schemas.microsoft.com/office/drawing/2014/main" id="{81A3A65C-403C-4D05-8697-CE5DF8A0411F}"/>
                   </a:ext>
                 </a:extLst>
               </p:cNvPr>
@@ -7209,8 +6937,8 @@
             </p:blipFill>
             <p:spPr>
               <a:xfrm>
-                <a:off x="332280" y="170380"/>
-                <a:ext cx="5835960" cy="72000"/>
+                <a:off x="2550000" y="6035580"/>
+                <a:ext cx="5102280" cy="36000"/>
               </a:xfrm>
               <a:prstGeom prst="rect">
                 <a:avLst/>
@@ -7219,14 +6947,14 @@
           </p:pic>
         </mc:Fallback>
       </mc:AlternateContent>
-      <mc:AlternateContent xmlns:mc="http://schemas.openxmlformats.org/markup-compatibility/2006" xmlns:p14="http://schemas.microsoft.com/office/powerpoint/2010/main">
-        <mc:Choice Requires="p14">
+      <mc:AlternateContent xmlns:mc="http://schemas.openxmlformats.org/markup-compatibility/2006">
+        <mc:Choice xmlns:p14="http://schemas.microsoft.com/office/powerpoint/2010/main" Requires="p14">
           <p:contentPart p14:bwMode="auto" r:id="rId38">
             <p14:nvContentPartPr>
-              <p14:cNvPr id="82" name="Ink 81">
+              <p14:cNvPr id="65" name="Ink 64">
                 <a:extLst>
                   <a:ext uri="{FF2B5EF4-FFF2-40B4-BE49-F238E27FC236}">
-                    <a16:creationId xmlns:a16="http://schemas.microsoft.com/office/drawing/2014/main" id="{7038ABDB-6404-48F5-BCB0-9AD89834EE1E}"/>
+                    <a16:creationId xmlns:a16="http://schemas.microsoft.com/office/drawing/2014/main" id="{ACD7E163-719A-4285-BFBE-C85B01A889B7}"/>
                   </a:ext>
                 </a:extLst>
               </p14:cNvPr>
@@ -7234,18 +6962,18 @@
               <p14:nvPr/>
             </p14:nvContentPartPr>
             <p14:xfrm>
-              <a:off x="215640" y="66340"/>
-              <a:ext cx="6034320" cy="360"/>
+              <a:off x="1044120" y="4323060"/>
+              <a:ext cx="368640" cy="1894680"/>
             </p14:xfrm>
           </p:contentPart>
         </mc:Choice>
-        <mc:Fallback xmlns="">
+        <mc:Fallback>
           <p:pic>
             <p:nvPicPr>
-              <p:cNvPr id="82" name="Ink 81">
+              <p:cNvPr id="65" name="Ink 64">
                 <a:extLst>
                   <a:ext uri="{FF2B5EF4-FFF2-40B4-BE49-F238E27FC236}">
-                    <a16:creationId xmlns:a16="http://schemas.microsoft.com/office/drawing/2014/main" id="{7038ABDB-6404-48F5-BCB0-9AD89834EE1E}"/>
+                    <a16:creationId xmlns:a16="http://schemas.microsoft.com/office/drawing/2014/main" id="{ACD7E163-719A-4285-BFBE-C85B01A889B7}"/>
                   </a:ext>
                 </a:extLst>
               </p:cNvPr>
@@ -7260,8 +6988,8 @@
             </p:blipFill>
             <p:spPr>
               <a:xfrm>
-                <a:off x="179640" y="30700"/>
-                <a:ext cx="6105960" cy="72000"/>
+                <a:off x="1026480" y="4305420"/>
+                <a:ext cx="404280" cy="1930320"/>
               </a:xfrm>
               <a:prstGeom prst="rect">
                 <a:avLst/>
@@ -7270,14 +6998,14 @@
           </p:pic>
         </mc:Fallback>
       </mc:AlternateContent>
-      <mc:AlternateContent xmlns:mc="http://schemas.openxmlformats.org/markup-compatibility/2006" xmlns:p14="http://schemas.microsoft.com/office/powerpoint/2010/main">
-        <mc:Choice Requires="p14">
+      <mc:AlternateContent xmlns:mc="http://schemas.openxmlformats.org/markup-compatibility/2006">
+        <mc:Choice xmlns:p14="http://schemas.microsoft.com/office/powerpoint/2010/main" Requires="p14">
           <p:contentPart p14:bwMode="auto" r:id="rId40">
             <p14:nvContentPartPr>
-              <p14:cNvPr id="86" name="Ink 85">
+              <p14:cNvPr id="66" name="Ink 65">
                 <a:extLst>
                   <a:ext uri="{FF2B5EF4-FFF2-40B4-BE49-F238E27FC236}">
-                    <a16:creationId xmlns:a16="http://schemas.microsoft.com/office/drawing/2014/main" id="{FEFCA991-D563-434C-BD3C-A2C2FD914BB3}"/>
+                    <a16:creationId xmlns:a16="http://schemas.microsoft.com/office/drawing/2014/main" id="{E3324C56-AF90-4D6C-8984-5CA95229ECEC}"/>
                   </a:ext>
                 </a:extLst>
               </p14:cNvPr>
@@ -7285,18 +7013,18 @@
               <p14:nvPr/>
             </p14:nvContentPartPr>
             <p14:xfrm>
-              <a:off x="240840" y="2170900"/>
-              <a:ext cx="671760" cy="39240"/>
+              <a:off x="1417080" y="6206940"/>
+              <a:ext cx="6438240" cy="360"/>
             </p14:xfrm>
           </p:contentPart>
         </mc:Choice>
-        <mc:Fallback xmlns="">
+        <mc:Fallback>
           <p:pic>
             <p:nvPicPr>
-              <p:cNvPr id="86" name="Ink 85">
+              <p:cNvPr id="66" name="Ink 65">
                 <a:extLst>
                   <a:ext uri="{FF2B5EF4-FFF2-40B4-BE49-F238E27FC236}">
-                    <a16:creationId xmlns:a16="http://schemas.microsoft.com/office/drawing/2014/main" id="{FEFCA991-D563-434C-BD3C-A2C2FD914BB3}"/>
+                    <a16:creationId xmlns:a16="http://schemas.microsoft.com/office/drawing/2014/main" id="{E3324C56-AF90-4D6C-8984-5CA95229ECEC}"/>
                   </a:ext>
                 </a:extLst>
               </p:cNvPr>
@@ -7311,8 +7039,8 @@
             </p:blipFill>
             <p:spPr>
               <a:xfrm>
-                <a:off x="205200" y="2135260"/>
-                <a:ext cx="743400" cy="110880"/>
+                <a:off x="1399080" y="6188940"/>
+                <a:ext cx="6473880" cy="36000"/>
               </a:xfrm>
               <a:prstGeom prst="rect">
                 <a:avLst/>
@@ -7321,14 +7049,14 @@
           </p:pic>
         </mc:Fallback>
       </mc:AlternateContent>
-      <mc:AlternateContent xmlns:mc="http://schemas.openxmlformats.org/markup-compatibility/2006" xmlns:p14="http://schemas.microsoft.com/office/powerpoint/2010/main">
-        <mc:Choice Requires="p14">
+      <mc:AlternateContent xmlns:mc="http://schemas.openxmlformats.org/markup-compatibility/2006">
+        <mc:Choice xmlns:p14="http://schemas.microsoft.com/office/powerpoint/2010/main" Requires="p14">
           <p:contentPart p14:bwMode="auto" r:id="rId42">
             <p14:nvContentPartPr>
-              <p14:cNvPr id="87" name="Ink 86">
+              <p14:cNvPr id="67" name="Ink 66">
                 <a:extLst>
                   <a:ext uri="{FF2B5EF4-FFF2-40B4-BE49-F238E27FC236}">
-                    <a16:creationId xmlns:a16="http://schemas.microsoft.com/office/drawing/2014/main" id="{F622D0D0-9627-4552-9391-5E779F9695D9}"/>
+                    <a16:creationId xmlns:a16="http://schemas.microsoft.com/office/drawing/2014/main" id="{A509E794-D538-48F9-B3FC-6AB928DD3C03}"/>
                   </a:ext>
                 </a:extLst>
               </p14:cNvPr>
@@ -7336,18 +7064,18 @@
               <p14:nvPr/>
             </p14:nvContentPartPr>
             <p14:xfrm>
-              <a:off x="368280" y="1919620"/>
-              <a:ext cx="522000" cy="74160"/>
+              <a:off x="7851000" y="3553740"/>
+              <a:ext cx="278640" cy="2649240"/>
             </p14:xfrm>
           </p:contentPart>
         </mc:Choice>
-        <mc:Fallback xmlns="">
+        <mc:Fallback>
           <p:pic>
             <p:nvPicPr>
-              <p:cNvPr id="87" name="Ink 86">
+              <p:cNvPr id="67" name="Ink 66">
                 <a:extLst>
                   <a:ext uri="{FF2B5EF4-FFF2-40B4-BE49-F238E27FC236}">
-                    <a16:creationId xmlns:a16="http://schemas.microsoft.com/office/drawing/2014/main" id="{F622D0D0-9627-4552-9391-5E779F9695D9}"/>
+                    <a16:creationId xmlns:a16="http://schemas.microsoft.com/office/drawing/2014/main" id="{A509E794-D538-48F9-B3FC-6AB928DD3C03}"/>
                   </a:ext>
                 </a:extLst>
               </p:cNvPr>
@@ -7362,8 +7090,8 @@
             </p:blipFill>
             <p:spPr>
               <a:xfrm>
-                <a:off x="332280" y="1883980"/>
-                <a:ext cx="593640" cy="145800"/>
+                <a:off x="7833000" y="3536100"/>
+                <a:ext cx="314280" cy="2684880"/>
               </a:xfrm>
               <a:prstGeom prst="rect">
                 <a:avLst/>
@@ -7372,14 +7100,14 @@
           </p:pic>
         </mc:Fallback>
       </mc:AlternateContent>
-      <mc:AlternateContent xmlns:mc="http://schemas.openxmlformats.org/markup-compatibility/2006" xmlns:p14="http://schemas.microsoft.com/office/powerpoint/2010/main">
-        <mc:Choice Requires="p14">
+      <mc:AlternateContent xmlns:mc="http://schemas.openxmlformats.org/markup-compatibility/2006">
+        <mc:Choice xmlns:p14="http://schemas.microsoft.com/office/powerpoint/2010/main" Requires="p14">
           <p:contentPart p14:bwMode="auto" r:id="rId44">
             <p14:nvContentPartPr>
-              <p14:cNvPr id="88" name="Ink 87">
+              <p14:cNvPr id="71" name="Ink 70">
                 <a:extLst>
                   <a:ext uri="{FF2B5EF4-FFF2-40B4-BE49-F238E27FC236}">
-                    <a16:creationId xmlns:a16="http://schemas.microsoft.com/office/drawing/2014/main" id="{B5877C2F-DA58-4573-825E-8DE7ACE39BB1}"/>
+                    <a16:creationId xmlns:a16="http://schemas.microsoft.com/office/drawing/2014/main" id="{E451A44E-27E0-4610-8AD7-85F9FA404C94}"/>
                   </a:ext>
                 </a:extLst>
               </p14:cNvPr>
@@ -7387,18 +7115,18 @@
               <p14:nvPr/>
             </p14:nvContentPartPr>
             <p14:xfrm>
-              <a:off x="2145960" y="2441260"/>
-              <a:ext cx="4282560" cy="360"/>
+              <a:off x="7624560" y="3414780"/>
+              <a:ext cx="278280" cy="2644560"/>
             </p14:xfrm>
           </p:contentPart>
         </mc:Choice>
-        <mc:Fallback xmlns="">
+        <mc:Fallback>
           <p:pic>
             <p:nvPicPr>
-              <p:cNvPr id="88" name="Ink 87">
+              <p:cNvPr id="71" name="Ink 70">
                 <a:extLst>
                   <a:ext uri="{FF2B5EF4-FFF2-40B4-BE49-F238E27FC236}">
-                    <a16:creationId xmlns:a16="http://schemas.microsoft.com/office/drawing/2014/main" id="{B5877C2F-DA58-4573-825E-8DE7ACE39BB1}"/>
+                    <a16:creationId xmlns:a16="http://schemas.microsoft.com/office/drawing/2014/main" id="{E451A44E-27E0-4610-8AD7-85F9FA404C94}"/>
                   </a:ext>
                 </a:extLst>
               </p:cNvPr>
@@ -7413,8 +7141,8 @@
             </p:blipFill>
             <p:spPr>
               <a:xfrm>
-                <a:off x="2110320" y="2405620"/>
-                <a:ext cx="4354200" cy="72000"/>
+                <a:off x="7606560" y="3396780"/>
+                <a:ext cx="313920" cy="2680200"/>
               </a:xfrm>
               <a:prstGeom prst="rect">
                 <a:avLst/>
@@ -7423,14 +7151,14 @@
           </p:pic>
         </mc:Fallback>
       </mc:AlternateContent>
-      <mc:AlternateContent xmlns:mc="http://schemas.openxmlformats.org/markup-compatibility/2006" xmlns:p14="http://schemas.microsoft.com/office/powerpoint/2010/main">
-        <mc:Choice Requires="p14">
+      <mc:AlternateContent xmlns:mc="http://schemas.openxmlformats.org/markup-compatibility/2006">
+        <mc:Choice xmlns:p14="http://schemas.microsoft.com/office/powerpoint/2010/main" Requires="p14">
           <p:contentPart p14:bwMode="auto" r:id="rId46">
             <p14:nvContentPartPr>
-              <p14:cNvPr id="91" name="Ink 90">
+              <p14:cNvPr id="18" name="Ink 17">
                 <a:extLst>
                   <a:ext uri="{FF2B5EF4-FFF2-40B4-BE49-F238E27FC236}">
-                    <a16:creationId xmlns:a16="http://schemas.microsoft.com/office/drawing/2014/main" id="{9B80D64C-066E-47C5-A28B-B0FA54E1D1E5}"/>
+                    <a16:creationId xmlns:a16="http://schemas.microsoft.com/office/drawing/2014/main" id="{58DC2C97-71A2-4A8C-9898-4058CBC725E9}"/>
                   </a:ext>
                 </a:extLst>
               </p14:cNvPr>
@@ -7438,18 +7166,18 @@
               <p14:nvPr/>
             </p14:nvContentPartPr>
             <p14:xfrm>
-              <a:off x="6387840" y="2159020"/>
-              <a:ext cx="137880" cy="294120"/>
+              <a:off x="2226000" y="1520100"/>
+              <a:ext cx="3918600" cy="412200"/>
             </p14:xfrm>
           </p:contentPart>
         </mc:Choice>
-        <mc:Fallback xmlns="">
+        <mc:Fallback>
           <p:pic>
             <p:nvPicPr>
-              <p:cNvPr id="91" name="Ink 90">
+              <p:cNvPr id="18" name="Ink 17">
                 <a:extLst>
                   <a:ext uri="{FF2B5EF4-FFF2-40B4-BE49-F238E27FC236}">
-                    <a16:creationId xmlns:a16="http://schemas.microsoft.com/office/drawing/2014/main" id="{9B80D64C-066E-47C5-A28B-B0FA54E1D1E5}"/>
+                    <a16:creationId xmlns:a16="http://schemas.microsoft.com/office/drawing/2014/main" id="{58DC2C97-71A2-4A8C-9898-4058CBC725E9}"/>
                   </a:ext>
                 </a:extLst>
               </p:cNvPr>
@@ -7464,8 +7192,8 @@
             </p:blipFill>
             <p:spPr>
               <a:xfrm>
-                <a:off x="6352200" y="2123380"/>
-                <a:ext cx="209520" cy="365760"/>
+                <a:off x="2208360" y="1502460"/>
+                <a:ext cx="3954240" cy="447840"/>
               </a:xfrm>
               <a:prstGeom prst="rect">
                 <a:avLst/>
@@ -7474,14 +7202,14 @@
           </p:pic>
         </mc:Fallback>
       </mc:AlternateContent>
-      <mc:AlternateContent xmlns:mc="http://schemas.openxmlformats.org/markup-compatibility/2006" xmlns:p14="http://schemas.microsoft.com/office/powerpoint/2010/main">
-        <mc:Choice Requires="p14">
+      <mc:AlternateContent xmlns:mc="http://schemas.openxmlformats.org/markup-compatibility/2006">
+        <mc:Choice xmlns:p14="http://schemas.microsoft.com/office/powerpoint/2010/main" Requires="p14">
           <p:contentPart p14:bwMode="auto" r:id="rId48">
             <p14:nvContentPartPr>
-              <p14:cNvPr id="92" name="Ink 91">
+              <p14:cNvPr id="17" name="Ink 16">
                 <a:extLst>
                   <a:ext uri="{FF2B5EF4-FFF2-40B4-BE49-F238E27FC236}">
-                    <a16:creationId xmlns:a16="http://schemas.microsoft.com/office/drawing/2014/main" id="{857ED214-FE9C-40B2-8998-DCB8FDC35F02}"/>
+                    <a16:creationId xmlns:a16="http://schemas.microsoft.com/office/drawing/2014/main" id="{1C77AC50-C802-4454-B9F3-F4698335DF59}"/>
                   </a:ext>
                 </a:extLst>
               </p14:cNvPr>
@@ -7489,18 +7217,18 @@
               <p14:nvPr/>
             </p14:nvContentPartPr>
             <p14:xfrm>
-              <a:off x="1163880" y="1676260"/>
-              <a:ext cx="360" cy="2170440"/>
+              <a:off x="2240040" y="1227060"/>
+              <a:ext cx="4023000" cy="423000"/>
             </p14:xfrm>
           </p:contentPart>
         </mc:Choice>
-        <mc:Fallback xmlns="">
+        <mc:Fallback>
           <p:pic>
             <p:nvPicPr>
-              <p:cNvPr id="92" name="Ink 91">
+              <p:cNvPr id="17" name="Ink 16">
                 <a:extLst>
                   <a:ext uri="{FF2B5EF4-FFF2-40B4-BE49-F238E27FC236}">
-                    <a16:creationId xmlns:a16="http://schemas.microsoft.com/office/drawing/2014/main" id="{857ED214-FE9C-40B2-8998-DCB8FDC35F02}"/>
+                    <a16:creationId xmlns:a16="http://schemas.microsoft.com/office/drawing/2014/main" id="{1C77AC50-C802-4454-B9F3-F4698335DF59}"/>
                   </a:ext>
                 </a:extLst>
               </p:cNvPr>
@@ -7515,620 +7243,8 @@
             </p:blipFill>
             <p:spPr>
               <a:xfrm>
-                <a:off x="1127880" y="1640260"/>
-                <a:ext cx="72000" cy="2242080"/>
-              </a:xfrm>
-              <a:prstGeom prst="rect">
-                <a:avLst/>
-              </a:prstGeom>
-            </p:spPr>
-          </p:pic>
-        </mc:Fallback>
-      </mc:AlternateContent>
-      <mc:AlternateContent xmlns:mc="http://schemas.openxmlformats.org/markup-compatibility/2006" xmlns:p14="http://schemas.microsoft.com/office/powerpoint/2010/main">
-        <mc:Choice Requires="p14">
-          <p:contentPart p14:bwMode="auto" r:id="rId50">
-            <p14:nvContentPartPr>
-              <p14:cNvPr id="95" name="Ink 94">
-                <a:extLst>
-                  <a:ext uri="{FF2B5EF4-FFF2-40B4-BE49-F238E27FC236}">
-                    <a16:creationId xmlns:a16="http://schemas.microsoft.com/office/drawing/2014/main" id="{5466D4DE-68E4-4ACF-963E-EAC18AEFC916}"/>
-                  </a:ext>
-                </a:extLst>
-              </p14:cNvPr>
-              <p14:cNvContentPartPr/>
-              <p14:nvPr/>
-            </p14:nvContentPartPr>
-            <p14:xfrm>
-              <a:off x="927000" y="1676260"/>
-              <a:ext cx="282600" cy="102600"/>
-            </p14:xfrm>
-          </p:contentPart>
-        </mc:Choice>
-        <mc:Fallback xmlns="">
-          <p:pic>
-            <p:nvPicPr>
-              <p:cNvPr id="95" name="Ink 94">
-                <a:extLst>
-                  <a:ext uri="{FF2B5EF4-FFF2-40B4-BE49-F238E27FC236}">
-                    <a16:creationId xmlns:a16="http://schemas.microsoft.com/office/drawing/2014/main" id="{5466D4DE-68E4-4ACF-963E-EAC18AEFC916}"/>
-                  </a:ext>
-                </a:extLst>
-              </p:cNvPr>
-              <p:cNvPicPr/>
-              <p:nvPr/>
-            </p:nvPicPr>
-            <p:blipFill>
-              <a:blip r:embed="rId51"/>
-              <a:stretch>
-                <a:fillRect/>
-              </a:stretch>
-            </p:blipFill>
-            <p:spPr>
-              <a:xfrm>
-                <a:off x="891000" y="1640260"/>
-                <a:ext cx="354240" cy="174240"/>
-              </a:xfrm>
-              <a:prstGeom prst="rect">
-                <a:avLst/>
-              </a:prstGeom>
-            </p:spPr>
-          </p:pic>
-        </mc:Fallback>
-      </mc:AlternateContent>
-      <mc:AlternateContent xmlns:mc="http://schemas.openxmlformats.org/markup-compatibility/2006" xmlns:p14="http://schemas.microsoft.com/office/powerpoint/2010/main">
-        <mc:Choice Requires="p14">
-          <p:contentPart p14:bwMode="auto" r:id="rId52">
-            <p14:nvContentPartPr>
-              <p14:cNvPr id="96" name="Ink 95">
-                <a:extLst>
-                  <a:ext uri="{FF2B5EF4-FFF2-40B4-BE49-F238E27FC236}">
-                    <a16:creationId xmlns:a16="http://schemas.microsoft.com/office/drawing/2014/main" id="{82747825-FEB7-4B81-9466-7AD651399643}"/>
-                  </a:ext>
-                </a:extLst>
-              </p14:cNvPr>
-              <p14:cNvContentPartPr/>
-              <p14:nvPr/>
-            </p14:nvContentPartPr>
-            <p14:xfrm>
-              <a:off x="4262760" y="2208700"/>
-              <a:ext cx="360" cy="1004400"/>
-            </p14:xfrm>
-          </p:contentPart>
-        </mc:Choice>
-        <mc:Fallback xmlns="">
-          <p:pic>
-            <p:nvPicPr>
-              <p:cNvPr id="96" name="Ink 95">
-                <a:extLst>
-                  <a:ext uri="{FF2B5EF4-FFF2-40B4-BE49-F238E27FC236}">
-                    <a16:creationId xmlns:a16="http://schemas.microsoft.com/office/drawing/2014/main" id="{82747825-FEB7-4B81-9466-7AD651399643}"/>
-                  </a:ext>
-                </a:extLst>
-              </p:cNvPr>
-              <p:cNvPicPr/>
-              <p:nvPr/>
-            </p:nvPicPr>
-            <p:blipFill>
-              <a:blip r:embed="rId53"/>
-              <a:stretch>
-                <a:fillRect/>
-              </a:stretch>
-            </p:blipFill>
-            <p:spPr>
-              <a:xfrm>
-                <a:off x="4226760" y="2172700"/>
-                <a:ext cx="72000" cy="1076040"/>
-              </a:xfrm>
-              <a:prstGeom prst="rect">
-                <a:avLst/>
-              </a:prstGeom>
-            </p:spPr>
-          </p:pic>
-        </mc:Fallback>
-      </mc:AlternateContent>
-      <mc:AlternateContent xmlns:mc="http://schemas.openxmlformats.org/markup-compatibility/2006" xmlns:p14="http://schemas.microsoft.com/office/powerpoint/2010/main">
-        <mc:Choice Requires="p14">
-          <p:contentPart p14:bwMode="auto" r:id="rId54">
-            <p14:nvContentPartPr>
-              <p14:cNvPr id="97" name="Ink 96">
-                <a:extLst>
-                  <a:ext uri="{FF2B5EF4-FFF2-40B4-BE49-F238E27FC236}">
-                    <a16:creationId xmlns:a16="http://schemas.microsoft.com/office/drawing/2014/main" id="{8AEC6F40-2A56-48F1-81B6-BE2CDF4A0F6B}"/>
-                  </a:ext>
-                </a:extLst>
-              </p14:cNvPr>
-              <p14:cNvContentPartPr/>
-              <p14:nvPr/>
-            </p14:nvContentPartPr>
-            <p14:xfrm>
-              <a:off x="2145960" y="2172700"/>
-              <a:ext cx="2097000" cy="360"/>
-            </p14:xfrm>
-          </p:contentPart>
-        </mc:Choice>
-        <mc:Fallback xmlns="">
-          <p:pic>
-            <p:nvPicPr>
-              <p:cNvPr id="97" name="Ink 96">
-                <a:extLst>
-                  <a:ext uri="{FF2B5EF4-FFF2-40B4-BE49-F238E27FC236}">
-                    <a16:creationId xmlns:a16="http://schemas.microsoft.com/office/drawing/2014/main" id="{8AEC6F40-2A56-48F1-81B6-BE2CDF4A0F6B}"/>
-                  </a:ext>
-                </a:extLst>
-              </p:cNvPr>
-              <p:cNvPicPr/>
-              <p:nvPr/>
-            </p:nvPicPr>
-            <p:blipFill>
-              <a:blip r:embed="rId55"/>
-              <a:stretch>
-                <a:fillRect/>
-              </a:stretch>
-            </p:blipFill>
-            <p:spPr>
-              <a:xfrm>
-                <a:off x="2110320" y="2136700"/>
-                <a:ext cx="2168640" cy="72000"/>
-              </a:xfrm>
-              <a:prstGeom prst="rect">
-                <a:avLst/>
-              </a:prstGeom>
-            </p:spPr>
-          </p:pic>
-        </mc:Fallback>
-      </mc:AlternateContent>
-      <mc:AlternateContent xmlns:mc="http://schemas.openxmlformats.org/markup-compatibility/2006" xmlns:p14="http://schemas.microsoft.com/office/powerpoint/2010/main">
-        <mc:Choice Requires="p14">
-          <p:contentPart p14:bwMode="auto" r:id="rId56">
-            <p14:nvContentPartPr>
-              <p14:cNvPr id="98" name="Ink 97">
-                <a:extLst>
-                  <a:ext uri="{FF2B5EF4-FFF2-40B4-BE49-F238E27FC236}">
-                    <a16:creationId xmlns:a16="http://schemas.microsoft.com/office/drawing/2014/main" id="{8C175F9D-D2E2-48D6-9571-D3C642A0CB6B}"/>
-                  </a:ext>
-                </a:extLst>
-              </p14:cNvPr>
-              <p14:cNvContentPartPr/>
-              <p14:nvPr/>
-            </p14:nvContentPartPr>
-            <p14:xfrm>
-              <a:off x="2107800" y="1918540"/>
-              <a:ext cx="2145960" cy="360"/>
-            </p14:xfrm>
-          </p:contentPart>
-        </mc:Choice>
-        <mc:Fallback xmlns="">
-          <p:pic>
-            <p:nvPicPr>
-              <p:cNvPr id="98" name="Ink 97">
-                <a:extLst>
-                  <a:ext uri="{FF2B5EF4-FFF2-40B4-BE49-F238E27FC236}">
-                    <a16:creationId xmlns:a16="http://schemas.microsoft.com/office/drawing/2014/main" id="{8C175F9D-D2E2-48D6-9571-D3C642A0CB6B}"/>
-                  </a:ext>
-                </a:extLst>
-              </p:cNvPr>
-              <p:cNvPicPr/>
-              <p:nvPr/>
-            </p:nvPicPr>
-            <p:blipFill>
-              <a:blip r:embed="rId57"/>
-              <a:stretch>
-                <a:fillRect/>
-              </a:stretch>
-            </p:blipFill>
-            <p:spPr>
-              <a:xfrm>
-                <a:off x="2071800" y="1882900"/>
-                <a:ext cx="2217600" cy="72000"/>
-              </a:xfrm>
-              <a:prstGeom prst="rect">
-                <a:avLst/>
-              </a:prstGeom>
-            </p:spPr>
-          </p:pic>
-        </mc:Fallback>
-      </mc:AlternateContent>
-      <mc:AlternateContent xmlns:mc="http://schemas.openxmlformats.org/markup-compatibility/2006" xmlns:p14="http://schemas.microsoft.com/office/powerpoint/2010/main">
-        <mc:Choice Requires="p14">
-          <p:contentPart p14:bwMode="auto" r:id="rId58">
-            <p14:nvContentPartPr>
-              <p14:cNvPr id="99" name="Ink 98">
-                <a:extLst>
-                  <a:ext uri="{FF2B5EF4-FFF2-40B4-BE49-F238E27FC236}">
-                    <a16:creationId xmlns:a16="http://schemas.microsoft.com/office/drawing/2014/main" id="{E3EE7B6E-91B7-488F-ADFB-6583FCC010C8}"/>
-                  </a:ext>
-                </a:extLst>
-              </p14:cNvPr>
-              <p14:cNvContentPartPr/>
-              <p14:nvPr/>
-            </p14:nvContentPartPr>
-            <p14:xfrm>
-              <a:off x="4241160" y="1359820"/>
-              <a:ext cx="3694680" cy="360"/>
-            </p14:xfrm>
-          </p:contentPart>
-        </mc:Choice>
-        <mc:Fallback xmlns="">
-          <p:pic>
-            <p:nvPicPr>
-              <p:cNvPr id="99" name="Ink 98">
-                <a:extLst>
-                  <a:ext uri="{FF2B5EF4-FFF2-40B4-BE49-F238E27FC236}">
-                    <a16:creationId xmlns:a16="http://schemas.microsoft.com/office/drawing/2014/main" id="{E3EE7B6E-91B7-488F-ADFB-6583FCC010C8}"/>
-                  </a:ext>
-                </a:extLst>
-              </p:cNvPr>
-              <p:cNvPicPr/>
-              <p:nvPr/>
-            </p:nvPicPr>
-            <p:blipFill>
-              <a:blip r:embed="rId59"/>
-              <a:stretch>
-                <a:fillRect/>
-              </a:stretch>
-            </p:blipFill>
-            <p:spPr>
-              <a:xfrm>
-                <a:off x="4205520" y="1323820"/>
-                <a:ext cx="3766320" cy="72000"/>
-              </a:xfrm>
-              <a:prstGeom prst="rect">
-                <a:avLst/>
-              </a:prstGeom>
-            </p:spPr>
-          </p:pic>
-        </mc:Fallback>
-      </mc:AlternateContent>
-      <mc:AlternateContent xmlns:mc="http://schemas.openxmlformats.org/markup-compatibility/2006" xmlns:p14="http://schemas.microsoft.com/office/powerpoint/2010/main">
-        <mc:Choice Requires="p14">
-          <p:contentPart p14:bwMode="auto" r:id="rId60">
-            <p14:nvContentPartPr>
-              <p14:cNvPr id="100" name="Ink 99">
-                <a:extLst>
-                  <a:ext uri="{FF2B5EF4-FFF2-40B4-BE49-F238E27FC236}">
-                    <a16:creationId xmlns:a16="http://schemas.microsoft.com/office/drawing/2014/main" id="{4F5C3644-1C02-43A0-8F4E-953BB875571E}"/>
-                  </a:ext>
-                </a:extLst>
-              </p14:cNvPr>
-              <p14:cNvContentPartPr/>
-              <p14:nvPr/>
-            </p14:nvContentPartPr>
-            <p14:xfrm>
-              <a:off x="4287600" y="1345780"/>
-              <a:ext cx="360" cy="603360"/>
-            </p14:xfrm>
-          </p:contentPart>
-        </mc:Choice>
-        <mc:Fallback xmlns="">
-          <p:pic>
-            <p:nvPicPr>
-              <p:cNvPr id="100" name="Ink 99">
-                <a:extLst>
-                  <a:ext uri="{FF2B5EF4-FFF2-40B4-BE49-F238E27FC236}">
-                    <a16:creationId xmlns:a16="http://schemas.microsoft.com/office/drawing/2014/main" id="{4F5C3644-1C02-43A0-8F4E-953BB875571E}"/>
-                  </a:ext>
-                </a:extLst>
-              </p:cNvPr>
-              <p:cNvPicPr/>
-              <p:nvPr/>
-            </p:nvPicPr>
-            <p:blipFill>
-              <a:blip r:embed="rId61"/>
-              <a:stretch>
-                <a:fillRect/>
-              </a:stretch>
-            </p:blipFill>
-            <p:spPr>
-              <a:xfrm>
-                <a:off x="4251600" y="1310140"/>
-                <a:ext cx="72000" cy="675000"/>
-              </a:xfrm>
-              <a:prstGeom prst="rect">
-                <a:avLst/>
-              </a:prstGeom>
-            </p:spPr>
-          </p:pic>
-        </mc:Fallback>
-      </mc:AlternateContent>
-      <mc:AlternateContent xmlns:mc="http://schemas.openxmlformats.org/markup-compatibility/2006" xmlns:p14="http://schemas.microsoft.com/office/powerpoint/2010/main">
-        <mc:Choice Requires="p14">
-          <p:contentPart p14:bwMode="auto" r:id="rId62">
-            <p14:nvContentPartPr>
-              <p14:cNvPr id="101" name="Ink 100">
-                <a:extLst>
-                  <a:ext uri="{FF2B5EF4-FFF2-40B4-BE49-F238E27FC236}">
-                    <a16:creationId xmlns:a16="http://schemas.microsoft.com/office/drawing/2014/main" id="{A80ADCE1-8DBC-4836-8165-951967D7B070}"/>
-                  </a:ext>
-                </a:extLst>
-              </p14:cNvPr>
-              <p14:cNvContentPartPr/>
-              <p14:nvPr/>
-            </p14:nvContentPartPr>
-            <p14:xfrm>
-              <a:off x="7970400" y="1358380"/>
-              <a:ext cx="360" cy="1944000"/>
-            </p14:xfrm>
-          </p:contentPart>
-        </mc:Choice>
-        <mc:Fallback xmlns="">
-          <p:pic>
-            <p:nvPicPr>
-              <p:cNvPr id="101" name="Ink 100">
-                <a:extLst>
-                  <a:ext uri="{FF2B5EF4-FFF2-40B4-BE49-F238E27FC236}">
-                    <a16:creationId xmlns:a16="http://schemas.microsoft.com/office/drawing/2014/main" id="{A80ADCE1-8DBC-4836-8165-951967D7B070}"/>
-                  </a:ext>
-                </a:extLst>
-              </p:cNvPr>
-              <p:cNvPicPr/>
-              <p:nvPr/>
-            </p:nvPicPr>
-            <p:blipFill>
-              <a:blip r:embed="rId63"/>
-              <a:stretch>
-                <a:fillRect/>
-              </a:stretch>
-            </p:blipFill>
-            <p:spPr>
-              <a:xfrm>
-                <a:off x="7934760" y="1322740"/>
-                <a:ext cx="72000" cy="2015640"/>
-              </a:xfrm>
-              <a:prstGeom prst="rect">
-                <a:avLst/>
-              </a:prstGeom>
-            </p:spPr>
-          </p:pic>
-        </mc:Fallback>
-      </mc:AlternateContent>
-      <mc:AlternateContent xmlns:mc="http://schemas.openxmlformats.org/markup-compatibility/2006" xmlns:p14="http://schemas.microsoft.com/office/powerpoint/2010/main">
-        <mc:Choice Requires="p14">
-          <p:contentPart p14:bwMode="auto" r:id="rId64">
-            <p14:nvContentPartPr>
-              <p14:cNvPr id="102" name="Ink 101">
-                <a:extLst>
-                  <a:ext uri="{FF2B5EF4-FFF2-40B4-BE49-F238E27FC236}">
-                    <a16:creationId xmlns:a16="http://schemas.microsoft.com/office/drawing/2014/main" id="{77B0DBC4-43BC-470F-A607-1B1437B499EB}"/>
-                  </a:ext>
-                </a:extLst>
-              </p14:cNvPr>
-              <p14:cNvContentPartPr/>
-              <p14:nvPr/>
-            </p14:nvContentPartPr>
-            <p14:xfrm>
-              <a:off x="4334760" y="3530260"/>
-              <a:ext cx="360" cy="1192680"/>
-            </p14:xfrm>
-          </p:contentPart>
-        </mc:Choice>
-        <mc:Fallback xmlns="">
-          <p:pic>
-            <p:nvPicPr>
-              <p:cNvPr id="102" name="Ink 101">
-                <a:extLst>
-                  <a:ext uri="{FF2B5EF4-FFF2-40B4-BE49-F238E27FC236}">
-                    <a16:creationId xmlns:a16="http://schemas.microsoft.com/office/drawing/2014/main" id="{77B0DBC4-43BC-470F-A607-1B1437B499EB}"/>
-                  </a:ext>
-                </a:extLst>
-              </p:cNvPr>
-              <p:cNvPicPr/>
-              <p:nvPr/>
-            </p:nvPicPr>
-            <p:blipFill>
-              <a:blip r:embed="rId65"/>
-              <a:stretch>
-                <a:fillRect/>
-              </a:stretch>
-            </p:blipFill>
-            <p:spPr>
-              <a:xfrm>
-                <a:off x="4299120" y="3494620"/>
-                <a:ext cx="72000" cy="1264320"/>
-              </a:xfrm>
-              <a:prstGeom prst="rect">
-                <a:avLst/>
-              </a:prstGeom>
-            </p:spPr>
-          </p:pic>
-        </mc:Fallback>
-      </mc:AlternateContent>
-      <mc:AlternateContent xmlns:mc="http://schemas.openxmlformats.org/markup-compatibility/2006" xmlns:p14="http://schemas.microsoft.com/office/powerpoint/2010/main">
-        <mc:Choice Requires="p14">
-          <p:contentPart p14:bwMode="auto" r:id="rId66">
-            <p14:nvContentPartPr>
-              <p14:cNvPr id="103" name="Ink 102">
-                <a:extLst>
-                  <a:ext uri="{FF2B5EF4-FFF2-40B4-BE49-F238E27FC236}">
-                    <a16:creationId xmlns:a16="http://schemas.microsoft.com/office/drawing/2014/main" id="{775BC082-33C7-4C3D-9970-028B249405AC}"/>
-                  </a:ext>
-                </a:extLst>
-              </p14:cNvPr>
-              <p14:cNvContentPartPr/>
-              <p14:nvPr/>
-            </p14:nvContentPartPr>
-            <p14:xfrm>
-              <a:off x="1157400" y="4701340"/>
-              <a:ext cx="3173400" cy="360"/>
-            </p14:xfrm>
-          </p:contentPart>
-        </mc:Choice>
-        <mc:Fallback xmlns="">
-          <p:pic>
-            <p:nvPicPr>
-              <p:cNvPr id="103" name="Ink 102">
-                <a:extLst>
-                  <a:ext uri="{FF2B5EF4-FFF2-40B4-BE49-F238E27FC236}">
-                    <a16:creationId xmlns:a16="http://schemas.microsoft.com/office/drawing/2014/main" id="{775BC082-33C7-4C3D-9970-028B249405AC}"/>
-                  </a:ext>
-                </a:extLst>
-              </p:cNvPr>
-              <p:cNvPicPr/>
-              <p:nvPr/>
-            </p:nvPicPr>
-            <p:blipFill>
-              <a:blip r:embed="rId67"/>
-              <a:stretch>
-                <a:fillRect/>
-              </a:stretch>
-            </p:blipFill>
-            <p:spPr>
-              <a:xfrm>
-                <a:off x="1121760" y="4665340"/>
-                <a:ext cx="3245040" cy="72000"/>
-              </a:xfrm>
-              <a:prstGeom prst="rect">
-                <a:avLst/>
-              </a:prstGeom>
-            </p:spPr>
-          </p:pic>
-        </mc:Fallback>
-      </mc:AlternateContent>
-      <mc:AlternateContent xmlns:mc="http://schemas.openxmlformats.org/markup-compatibility/2006" xmlns:p14="http://schemas.microsoft.com/office/powerpoint/2010/main">
-        <mc:Choice Requires="p14">
-          <p:contentPart p14:bwMode="auto" r:id="rId68">
-            <p14:nvContentPartPr>
-              <p14:cNvPr id="104" name="Ink 103">
-                <a:extLst>
-                  <a:ext uri="{FF2B5EF4-FFF2-40B4-BE49-F238E27FC236}">
-                    <a16:creationId xmlns:a16="http://schemas.microsoft.com/office/drawing/2014/main" id="{28E17B76-D2D4-46E6-A81D-3AC0806D7EE9}"/>
-                  </a:ext>
-                </a:extLst>
-              </p14:cNvPr>
-              <p14:cNvContentPartPr/>
-              <p14:nvPr/>
-            </p14:nvContentPartPr>
-            <p14:xfrm>
-              <a:off x="4317480" y="4548700"/>
-              <a:ext cx="3976920" cy="360"/>
-            </p14:xfrm>
-          </p:contentPart>
-        </mc:Choice>
-        <mc:Fallback xmlns="">
-          <p:pic>
-            <p:nvPicPr>
-              <p:cNvPr id="104" name="Ink 103">
-                <a:extLst>
-                  <a:ext uri="{FF2B5EF4-FFF2-40B4-BE49-F238E27FC236}">
-                    <a16:creationId xmlns:a16="http://schemas.microsoft.com/office/drawing/2014/main" id="{28E17B76-D2D4-46E6-A81D-3AC0806D7EE9}"/>
-                  </a:ext>
-                </a:extLst>
-              </p:cNvPr>
-              <p:cNvPicPr/>
-              <p:nvPr/>
-            </p:nvPicPr>
-            <p:blipFill>
-              <a:blip r:embed="rId69"/>
-              <a:stretch>
-                <a:fillRect/>
-              </a:stretch>
-            </p:blipFill>
-            <p:spPr>
-              <a:xfrm>
-                <a:off x="4281840" y="4513060"/>
-                <a:ext cx="4048560" cy="72000"/>
-              </a:xfrm>
-              <a:prstGeom prst="rect">
-                <a:avLst/>
-              </a:prstGeom>
-            </p:spPr>
-          </p:pic>
-        </mc:Fallback>
-      </mc:AlternateContent>
-      <mc:AlternateContent xmlns:mc="http://schemas.openxmlformats.org/markup-compatibility/2006" xmlns:p14="http://schemas.microsoft.com/office/powerpoint/2010/main">
-        <mc:Choice Requires="p14">
-          <p:contentPart p14:bwMode="auto" r:id="rId70">
-            <p14:nvContentPartPr>
-              <p14:cNvPr id="105" name="Ink 104">
-                <a:extLst>
-                  <a:ext uri="{FF2B5EF4-FFF2-40B4-BE49-F238E27FC236}">
-                    <a16:creationId xmlns:a16="http://schemas.microsoft.com/office/drawing/2014/main" id="{3CFB9324-859A-4EA6-9C09-1514DFDC2163}"/>
-                  </a:ext>
-                </a:extLst>
-              </p14:cNvPr>
-              <p14:cNvContentPartPr/>
-              <p14:nvPr/>
-            </p14:nvContentPartPr>
-            <p14:xfrm>
-              <a:off x="8332920" y="3659500"/>
-              <a:ext cx="360" cy="874440"/>
-            </p14:xfrm>
-          </p:contentPart>
-        </mc:Choice>
-        <mc:Fallback xmlns="">
-          <p:pic>
-            <p:nvPicPr>
-              <p:cNvPr id="105" name="Ink 104">
-                <a:extLst>
-                  <a:ext uri="{FF2B5EF4-FFF2-40B4-BE49-F238E27FC236}">
-                    <a16:creationId xmlns:a16="http://schemas.microsoft.com/office/drawing/2014/main" id="{3CFB9324-859A-4EA6-9C09-1514DFDC2163}"/>
-                  </a:ext>
-                </a:extLst>
-              </p:cNvPr>
-              <p:cNvPicPr/>
-              <p:nvPr/>
-            </p:nvPicPr>
-            <p:blipFill>
-              <a:blip r:embed="rId71"/>
-              <a:stretch>
-                <a:fillRect/>
-              </a:stretch>
-            </p:blipFill>
-            <p:spPr>
-              <a:xfrm>
-                <a:off x="8296920" y="3623500"/>
-                <a:ext cx="72000" cy="946080"/>
-              </a:xfrm>
-              <a:prstGeom prst="rect">
-                <a:avLst/>
-              </a:prstGeom>
-            </p:spPr>
-          </p:pic>
-        </mc:Fallback>
-      </mc:AlternateContent>
-      <mc:AlternateContent xmlns:mc="http://schemas.openxmlformats.org/markup-compatibility/2006" xmlns:p14="http://schemas.microsoft.com/office/powerpoint/2010/main">
-        <mc:Choice Requires="p14">
-          <p:contentPart p14:bwMode="auto" r:id="rId72">
-            <p14:nvContentPartPr>
-              <p14:cNvPr id="106" name="Ink 105">
-                <a:extLst>
-                  <a:ext uri="{FF2B5EF4-FFF2-40B4-BE49-F238E27FC236}">
-                    <a16:creationId xmlns:a16="http://schemas.microsoft.com/office/drawing/2014/main" id="{962C68CA-D5F0-48C4-978D-7D3601853C90}"/>
-                  </a:ext>
-                </a:extLst>
-              </p14:cNvPr>
-              <p14:cNvContentPartPr/>
-              <p14:nvPr/>
-            </p14:nvContentPartPr>
-            <p14:xfrm>
-              <a:off x="1170000" y="1720180"/>
-              <a:ext cx="360" cy="2976120"/>
-            </p14:xfrm>
-          </p:contentPart>
-        </mc:Choice>
-        <mc:Fallback xmlns="">
-          <p:pic>
-            <p:nvPicPr>
-              <p:cNvPr id="106" name="Ink 105">
-                <a:extLst>
-                  <a:ext uri="{FF2B5EF4-FFF2-40B4-BE49-F238E27FC236}">
-                    <a16:creationId xmlns:a16="http://schemas.microsoft.com/office/drawing/2014/main" id="{962C68CA-D5F0-48C4-978D-7D3601853C90}"/>
-                  </a:ext>
-                </a:extLst>
-              </p:cNvPr>
-              <p:cNvPicPr/>
-              <p:nvPr/>
-            </p:nvPicPr>
-            <p:blipFill>
-              <a:blip r:embed="rId73"/>
-              <a:stretch>
-                <a:fillRect/>
-              </a:stretch>
-            </p:blipFill>
-            <p:spPr>
-              <a:xfrm>
-                <a:off x="1134360" y="1684180"/>
-                <a:ext cx="72000" cy="3047760"/>
+                <a:off x="2222400" y="1209060"/>
+                <a:ext cx="4058640" cy="458640"/>
               </a:xfrm>
               <a:prstGeom prst="rect">
                 <a:avLst/>

</xml_diff>